<commit_message>
Revised slides for ER modeling
</commit_message>
<xml_diff>
--- a/02-SQL/A-ER_modeling-1.pptx
+++ b/02-SQL/A-ER_modeling-1.pptx
@@ -26,9 +26,9 @@
     <p:sldId id="279" r:id="rId14"/>
     <p:sldId id="283" r:id="rId15"/>
     <p:sldId id="286" r:id="rId16"/>
-    <p:sldId id="288" r:id="rId17"/>
-    <p:sldId id="289" r:id="rId18"/>
-    <p:sldId id="287" r:id="rId19"/>
+    <p:sldId id="287" r:id="rId17"/>
+    <p:sldId id="288" r:id="rId18"/>
+    <p:sldId id="289" r:id="rId19"/>
     <p:sldId id="290" r:id="rId20"/>
     <p:sldId id="291" r:id="rId21"/>
     <p:sldId id="292" r:id="rId22"/>
@@ -264,7 +264,7 @@
                 <a:ea typeface="Arial Unicode MS" panose="020B0604020202020204" pitchFamily="34" charset="-128"/>
                 <a:cs typeface="Arial Unicode MS" panose="020B0604020202020204" pitchFamily="34" charset="-128"/>
               </a:rPr>
-              <a:t>10/22/2016</a:t>
+              <a:t>5/16/2018</a:t>
             </a:fld>
             <a:endParaRPr lang="en-US" dirty="0">
               <a:latin typeface="Arial Unicode MS" panose="020B0604020202020204" pitchFamily="34" charset="-128"/>
@@ -619,7 +619,6 @@
               <a:defRPr sz="1800"/>
             </a:pPr>
             <a:r>
-              <a:rPr/>
               <a:t>Today we will open the main topic of this class, which is databases. Before we start talking about databases do you have any questions about what we have done so far? Do you have any questions about the homework?</a:t>
             </a:r>
           </a:p>
@@ -634,7 +633,6 @@
               <a:defRPr sz="1800"/>
             </a:pPr>
             <a:r>
-              <a:rPr/>
               <a:t>In todays world, databases are used practically in every system. Pretty much any website is built up on top of a database. All organizations (banks, hospitals, universities etc) have their own databases. So we will start with the definition. Anyone want to try? What is the first thing that comes in mind when you hear the word “database”?</a:t>
             </a:r>
           </a:p>
@@ -792,7 +790,6 @@
               <a:defRPr sz="1800"/>
             </a:pPr>
             <a:r>
-              <a:rPr/>
               <a:t>Stop at 4 minutes.</a:t>
             </a:r>
           </a:p>
@@ -997,7 +994,6 @@
               <a:defRPr sz="1800"/>
             </a:pPr>
             <a:r>
-              <a:rPr/>
               <a:t>For example, assume that we have these two entities, Students and courses. A student can take 0, 1, 2 or more courses, </a:t>
             </a:r>
           </a:p>
@@ -1035,7 +1031,7 @@
       </p:grpSpPr>
       <p:sp>
         <p:nvSpPr>
-          <p:cNvPr id="421" name="Shape 421"/>
+          <p:cNvPr id="2" name="Slide Image Placeholder 1"/>
           <p:cNvSpPr>
             <a:spLocks noGrp="1" noRot="1" noChangeAspect="1"/>
           </p:cNvSpPr>
@@ -1043,53 +1039,31 @@
             <p:ph type="sldImg"/>
           </p:nvPr>
         </p:nvSpPr>
-        <p:spPr>
-          <a:prstGeom prst="rect">
-            <a:avLst/>
-          </a:prstGeom>
-        </p:spPr>
-        <p:txBody>
-          <a:bodyPr/>
-          <a:lstStyle/>
-          <a:p>
-            <a:pPr lvl="0"/>
-            <a:endParaRPr/>
-          </a:p>
-        </p:txBody>
-      </p:sp>
-      <p:sp>
-        <p:nvSpPr>
-          <p:cNvPr id="422" name="Shape 422"/>
+        <p:spPr/>
+      </p:sp>
+      <p:sp>
+        <p:nvSpPr>
+          <p:cNvPr id="3" name="Notes Placeholder 2"/>
           <p:cNvSpPr>
             <a:spLocks noGrp="1"/>
           </p:cNvSpPr>
           <p:nvPr>
-            <p:ph type="body" sz="quarter" idx="1"/>
+            <p:ph type="body" idx="1"/>
           </p:nvPr>
         </p:nvSpPr>
-        <p:spPr>
-          <a:prstGeom prst="rect">
-            <a:avLst/>
-          </a:prstGeom>
-        </p:spPr>
+        <p:spPr/>
         <p:txBody>
           <a:bodyPr/>
           <a:lstStyle/>
           <a:p>
-            <a:pPr lvl="0">
-              <a:defRPr sz="1800"/>
-            </a:pPr>
-            <a:r>
-              <a:rPr/>
-              <a:t>Here is another example, where we have two entities, the course enticing with attributes…and the offering entity with ….and the relationship that shows that a course has an offering (or is offered) we can see the cardinality represntation, </a:t>
-            </a:r>
+            <a:endParaRPr lang="en-US"/>
           </a:p>
         </p:txBody>
       </p:sp>
     </p:spTree>
     <p:extLst>
       <p:ext uri="{BB962C8B-B14F-4D97-AF65-F5344CB8AC3E}">
-        <p14:creationId xmlns:p14="http://schemas.microsoft.com/office/powerpoint/2010/main" val="1269861236"/>
+        <p14:creationId xmlns:p14="http://schemas.microsoft.com/office/powerpoint/2010/main" val="1531698861"/>
       </p:ext>
     </p:extLst>
   </p:cSld>
@@ -1118,7 +1092,7 @@
       </p:grpSpPr>
       <p:sp>
         <p:nvSpPr>
-          <p:cNvPr id="2" name="Slide Image Placeholder 1"/>
+          <p:cNvPr id="421" name="Shape 421"/>
           <p:cNvSpPr>
             <a:spLocks noGrp="1" noRot="1" noChangeAspect="1"/>
           </p:cNvSpPr>
@@ -1126,31 +1100,52 @@
             <p:ph type="sldImg"/>
           </p:nvPr>
         </p:nvSpPr>
-        <p:spPr/>
-      </p:sp>
-      <p:sp>
-        <p:nvSpPr>
-          <p:cNvPr id="3" name="Notes Placeholder 2"/>
+        <p:spPr>
+          <a:prstGeom prst="rect">
+            <a:avLst/>
+          </a:prstGeom>
+        </p:spPr>
+        <p:txBody>
+          <a:bodyPr/>
+          <a:lstStyle/>
+          <a:p>
+            <a:pPr lvl="0"/>
+            <a:endParaRPr/>
+          </a:p>
+        </p:txBody>
+      </p:sp>
+      <p:sp>
+        <p:nvSpPr>
+          <p:cNvPr id="422" name="Shape 422"/>
           <p:cNvSpPr>
             <a:spLocks noGrp="1"/>
           </p:cNvSpPr>
           <p:nvPr>
-            <p:ph type="body" idx="1"/>
+            <p:ph type="body" sz="quarter" idx="1"/>
           </p:nvPr>
         </p:nvSpPr>
-        <p:spPr/>
+        <p:spPr>
+          <a:prstGeom prst="rect">
+            <a:avLst/>
+          </a:prstGeom>
+        </p:spPr>
         <p:txBody>
           <a:bodyPr/>
           <a:lstStyle/>
           <a:p>
-            <a:endParaRPr lang="en-US"/>
+            <a:pPr lvl="0">
+              <a:defRPr sz="1800"/>
+            </a:pPr>
+            <a:r>
+              <a:t>Here is another example, where we have two entities, the course enticing with attributes…and the offering entity with ….and the relationship that shows that a course has an offering (or is offered) we can see the cardinality represntation, </a:t>
+            </a:r>
           </a:p>
         </p:txBody>
       </p:sp>
     </p:spTree>
     <p:extLst>
       <p:ext uri="{BB962C8B-B14F-4D97-AF65-F5344CB8AC3E}">
-        <p14:creationId xmlns:p14="http://schemas.microsoft.com/office/powerpoint/2010/main" val="1365297967"/>
+        <p14:creationId xmlns:p14="http://schemas.microsoft.com/office/powerpoint/2010/main" val="1269861236"/>
       </p:ext>
     </p:extLst>
   </p:cSld>
@@ -1211,7 +1206,7 @@
     </p:spTree>
     <p:extLst>
       <p:ext uri="{BB962C8B-B14F-4D97-AF65-F5344CB8AC3E}">
-        <p14:creationId xmlns:p14="http://schemas.microsoft.com/office/powerpoint/2010/main" val="1531698861"/>
+        <p14:creationId xmlns:p14="http://schemas.microsoft.com/office/powerpoint/2010/main" val="1365297967"/>
       </p:ext>
     </p:extLst>
   </p:cSld>
@@ -1596,7 +1591,6 @@
               <a:defRPr sz="1800"/>
             </a:pPr>
             <a:r>
-              <a:rPr/>
               <a:t>Last time we discussed ER diagrams. </a:t>
             </a:r>
           </a:p>
@@ -2106,7 +2100,6 @@
               <a:defRPr sz="1800"/>
             </a:pPr>
             <a:r>
-              <a:rPr/>
               <a:t>Now we will move forward and discuss the entity relationship diagram, which is a methodology that help us understand what data we have, and what is the best way to structure our database. </a:t>
             </a:r>
           </a:p>
@@ -2421,7 +2414,7 @@
           <a:p>
             <a:fld id="{E9385586-C094-4874-A3EB-1898CF456001}" type="datetimeFigureOut">
               <a:rPr lang="en-US" smtClean="0"/>
-              <a:t>10/22/2016</a:t>
+              <a:t>5/16/2018</a:t>
             </a:fld>
             <a:endParaRPr lang="en-US"/>
           </a:p>
@@ -2590,7 +2583,7 @@
           <a:p>
             <a:fld id="{E9385586-C094-4874-A3EB-1898CF456001}" type="datetimeFigureOut">
               <a:rPr lang="en-US" smtClean="0"/>
-              <a:t>10/22/2016</a:t>
+              <a:t>5/16/2018</a:t>
             </a:fld>
             <a:endParaRPr lang="en-US"/>
           </a:p>
@@ -2769,7 +2762,7 @@
           <a:p>
             <a:fld id="{E9385586-C094-4874-A3EB-1898CF456001}" type="datetimeFigureOut">
               <a:rPr lang="en-US" smtClean="0"/>
-              <a:t>10/22/2016</a:t>
+              <a:t>5/16/2018</a:t>
             </a:fld>
             <a:endParaRPr lang="en-US"/>
           </a:p>
@@ -2969,7 +2962,7 @@
           <a:p>
             <a:fld id="{E9385586-C094-4874-A3EB-1898CF456001}" type="datetimeFigureOut">
               <a:rPr lang="en-US" smtClean="0"/>
-              <a:t>10/22/2016</a:t>
+              <a:t>5/16/2018</a:t>
             </a:fld>
             <a:endParaRPr lang="en-US"/>
           </a:p>
@@ -3214,7 +3207,7 @@
           <a:p>
             <a:fld id="{E9385586-C094-4874-A3EB-1898CF456001}" type="datetimeFigureOut">
               <a:rPr lang="en-US" smtClean="0"/>
-              <a:t>10/22/2016</a:t>
+              <a:t>5/16/2018</a:t>
             </a:fld>
             <a:endParaRPr lang="en-US"/>
           </a:p>
@@ -3444,7 +3437,7 @@
           <a:p>
             <a:fld id="{E9385586-C094-4874-A3EB-1898CF456001}" type="datetimeFigureOut">
               <a:rPr lang="en-US" smtClean="0"/>
-              <a:t>10/22/2016</a:t>
+              <a:t>5/16/2018</a:t>
             </a:fld>
             <a:endParaRPr lang="en-US"/>
           </a:p>
@@ -3809,7 +3802,7 @@
           <a:p>
             <a:fld id="{E9385586-C094-4874-A3EB-1898CF456001}" type="datetimeFigureOut">
               <a:rPr lang="en-US" smtClean="0"/>
-              <a:t>10/22/2016</a:t>
+              <a:t>5/16/2018</a:t>
             </a:fld>
             <a:endParaRPr lang="en-US"/>
           </a:p>
@@ -3927,7 +3920,7 @@
           <a:p>
             <a:fld id="{E9385586-C094-4874-A3EB-1898CF456001}" type="datetimeFigureOut">
               <a:rPr lang="en-US" smtClean="0"/>
-              <a:t>10/22/2016</a:t>
+              <a:t>5/16/2018</a:t>
             </a:fld>
             <a:endParaRPr lang="en-US"/>
           </a:p>
@@ -4022,7 +4015,7 @@
           <a:p>
             <a:fld id="{E9385586-C094-4874-A3EB-1898CF456001}" type="datetimeFigureOut">
               <a:rPr lang="en-US" smtClean="0"/>
-              <a:t>10/22/2016</a:t>
+              <a:t>5/16/2018</a:t>
             </a:fld>
             <a:endParaRPr lang="en-US"/>
           </a:p>
@@ -4298,7 +4291,7 @@
           <a:p>
             <a:fld id="{E9385586-C094-4874-A3EB-1898CF456001}" type="datetimeFigureOut">
               <a:rPr lang="en-US" smtClean="0"/>
-              <a:t>10/22/2016</a:t>
+              <a:t>5/16/2018</a:t>
             </a:fld>
             <a:endParaRPr lang="en-US"/>
           </a:p>
@@ -4551,7 +4544,7 @@
           <a:p>
             <a:fld id="{E9385586-C094-4874-A3EB-1898CF456001}" type="datetimeFigureOut">
               <a:rPr lang="en-US" smtClean="0"/>
-              <a:t>10/22/2016</a:t>
+              <a:t>5/16/2018</a:t>
             </a:fld>
             <a:endParaRPr lang="en-US"/>
           </a:p>
@@ -4767,7 +4760,7 @@
             <a:fld id="{E9385586-C094-4874-A3EB-1898CF456001}" type="datetimeFigureOut">
               <a:rPr lang="en-US" smtClean="0"/>
               <a:pPr/>
-              <a:t>10/22/2016</a:t>
+              <a:t>5/16/2018</a:t>
             </a:fld>
             <a:endParaRPr lang="en-US" dirty="0"/>
           </a:p>
@@ -5226,9 +5219,9 @@
               </a:defRPr>
             </a:pPr>
             <a:r>
-              <a:rPr sz="3600" dirty="0">
-                <a:solidFill>
-                  <a:schemeClr val="tx1"/>
+              <a:rPr sz="3600" b="1" dirty="0">
+                <a:solidFill>
+                  <a:srgbClr val="57068C"/>
                 </a:solidFill>
                 <a:uFill>
                   <a:solidFill/>
@@ -5292,7 +5285,11 @@
               <a:defRPr/>
             </a:pPr>
             <a:r>
-              <a:rPr lang="en-US" dirty="0"/>
+              <a:rPr lang="en-US" dirty="0">
+                <a:solidFill>
+                  <a:srgbClr val="57068C"/>
+                </a:solidFill>
+              </a:rPr>
               <a:t>Database schema</a:t>
             </a:r>
           </a:p>
@@ -6868,7 +6865,11 @@
               <a:defRPr/>
             </a:pPr>
             <a:r>
-              <a:rPr lang="en-US" dirty="0"/>
+              <a:rPr lang="en-US" dirty="0">
+                <a:solidFill>
+                  <a:srgbClr val="57068C"/>
+                </a:solidFill>
+              </a:rPr>
               <a:t>Key Question: How do we design the tables?</a:t>
             </a:r>
           </a:p>
@@ -7222,9 +7223,9 @@
               </a:defRPr>
             </a:pPr>
             <a:r>
-              <a:rPr sz="3000" b="1" dirty="0">
-                <a:solidFill>
-                  <a:schemeClr val="tx1"/>
+              <a:rPr sz="3000" b="0" dirty="0">
+                <a:solidFill>
+                  <a:srgbClr val="57068C"/>
                 </a:solidFill>
                 <a:uFill>
                   <a:solidFill>
@@ -7297,7 +7298,37 @@
                 <a:cs typeface="Arial Unicode MS" panose="020B0604020202020204" pitchFamily="34" charset="-128"/>
                 <a:sym typeface="Iowan Old Style Roman"/>
               </a:rPr>
-              <a:t>An entity is a collection of objects with </a:t>
+              <a:t>An </a:t>
+            </a:r>
+            <a:r>
+              <a:rPr sz="2100" b="1" dirty="0">
+                <a:solidFill>
+                  <a:srgbClr val="57068C"/>
+                </a:solidFill>
+                <a:uFill>
+                  <a:solidFill/>
+                </a:uFill>
+                <a:latin typeface="Arial Unicode MS" panose="020B0604020202020204" pitchFamily="34" charset="-128"/>
+                <a:ea typeface="Arial Unicode MS" panose="020B0604020202020204" pitchFamily="34" charset="-128"/>
+                <a:cs typeface="Arial Unicode MS" panose="020B0604020202020204" pitchFamily="34" charset="-128"/>
+                <a:sym typeface="Iowan Old Style Roman"/>
+              </a:rPr>
+              <a:t>entity</a:t>
+            </a:r>
+            <a:r>
+              <a:rPr sz="2100" dirty="0">
+                <a:solidFill>
+                  <a:schemeClr val="tx1"/>
+                </a:solidFill>
+                <a:uFill>
+                  <a:solidFill/>
+                </a:uFill>
+                <a:latin typeface="Arial Unicode MS" panose="020B0604020202020204" pitchFamily="34" charset="-128"/>
+                <a:ea typeface="Arial Unicode MS" panose="020B0604020202020204" pitchFamily="34" charset="-128"/>
+                <a:cs typeface="Arial Unicode MS" panose="020B0604020202020204" pitchFamily="34" charset="-128"/>
+                <a:sym typeface="Iowan Old Style Roman"/>
+              </a:rPr>
+              <a:t> is a collection of objects with </a:t>
             </a:r>
             <a:r>
               <a:rPr sz="2100" b="1" dirty="0">
@@ -7408,7 +7439,7 @@
           </a:prstGeom>
           <a:ln w="38100">
             <a:solidFill>
-              <a:srgbClr val="FF2600"/>
+              <a:srgbClr val="57068C"/>
             </a:solidFill>
             <a:round/>
           </a:ln>
@@ -7430,7 +7461,7 @@
             </a:pPr>
             <a:endParaRPr dirty="0">
               <a:solidFill>
-                <a:schemeClr val="tx1"/>
+                <a:srgbClr val="57068C"/>
               </a:solidFill>
               <a:latin typeface="Arial Unicode MS" panose="020B0604020202020204" pitchFamily="34" charset="-128"/>
               <a:ea typeface="Arial Unicode MS" panose="020B0604020202020204" pitchFamily="34" charset="-128"/>
@@ -7455,7 +7486,7 @@
           </a:prstGeom>
           <a:ln w="38100">
             <a:solidFill>
-              <a:srgbClr val="FF2600"/>
+              <a:srgbClr val="57068C"/>
             </a:solidFill>
             <a:round/>
           </a:ln>
@@ -7532,9 +7563,9 @@
               </a:defRPr>
             </a:pPr>
             <a:r>
-              <a:rPr sz="2000" dirty="0">
-                <a:solidFill>
-                  <a:schemeClr val="tx1"/>
+              <a:rPr sz="2000" b="1" dirty="0">
+                <a:solidFill>
+                  <a:srgbClr val="57068C"/>
                 </a:solidFill>
                 <a:uFill>
                   <a:solidFill/>
@@ -8183,9 +8214,9 @@
               </a:defRPr>
             </a:pPr>
             <a:r>
-              <a:rPr sz="3000" b="1" dirty="0">
-                <a:solidFill>
-                  <a:schemeClr val="tx1"/>
+              <a:rPr sz="3000" b="0" dirty="0">
+                <a:solidFill>
+                  <a:srgbClr val="57068C"/>
                 </a:solidFill>
                 <a:uFill>
                   <a:solidFill>
@@ -8210,7 +8241,7 @@
         <p:spPr>
           <a:xfrm>
             <a:off x="245637" y="895059"/>
-            <a:ext cx="5279253" cy="5560497"/>
+            <a:ext cx="5480249" cy="5893921"/>
           </a:xfrm>
           <a:prstGeom prst="rect">
             <a:avLst/>
@@ -8389,18 +8420,6 @@
               </a:defRPr>
             </a:pPr>
             <a:r>
-              <a:rPr lang="en-US" sz="2600" dirty="0">
-                <a:solidFill>
-                  <a:schemeClr val="tx1"/>
-                </a:solidFill>
-                <a:latin typeface="Arial Unicode MS" panose="020B0604020202020204" pitchFamily="34" charset="-128"/>
-                <a:ea typeface="Arial Unicode MS" panose="020B0604020202020204" pitchFamily="34" charset="-128"/>
-                <a:cs typeface="Arial Unicode MS" panose="020B0604020202020204" pitchFamily="34" charset="-128"/>
-                <a:sym typeface="Iowan Old Style Roman"/>
-              </a:rPr>
-              <a:t>  </a:t>
-            </a:r>
-            <a:r>
               <a:rPr lang="en-US" sz="2600" b="1" dirty="0">
                 <a:solidFill>
                   <a:schemeClr val="tx1"/>
@@ -8423,6 +8442,56 @@
                 <a:sym typeface="Iowan Old Style Roman"/>
               </a:rPr>
               <a:t>in the courses entity </a:t>
+            </a:r>
+          </a:p>
+          <a:p>
+            <a:pPr marL="685800" lvl="1" indent="-304800">
+              <a:spcBef>
+                <a:spcPts val="700"/>
+              </a:spcBef>
+              <a:buSzPct val="100000"/>
+              <a:buChar char="•"/>
+              <a:defRPr sz="1800">
+                <a:solidFill>
+                  <a:srgbClr val="000000"/>
+                </a:solidFill>
+                <a:uFillTx/>
+              </a:defRPr>
+            </a:pPr>
+            <a:endParaRPr lang="en-US" sz="2600" dirty="0">
+              <a:solidFill>
+                <a:schemeClr val="tx1"/>
+              </a:solidFill>
+              <a:latin typeface="Arial Unicode MS" panose="020B0604020202020204" pitchFamily="34" charset="-128"/>
+              <a:ea typeface="Arial Unicode MS" panose="020B0604020202020204" pitchFamily="34" charset="-128"/>
+              <a:cs typeface="Arial Unicode MS" panose="020B0604020202020204" pitchFamily="34" charset="-128"/>
+              <a:sym typeface="Iowan Old Style Roman"/>
+            </a:endParaRPr>
+          </a:p>
+          <a:p>
+            <a:pPr marL="381000" algn="ctr">
+              <a:spcBef>
+                <a:spcPts val="700"/>
+              </a:spcBef>
+              <a:buSzPct val="100000"/>
+              <a:defRPr sz="1800">
+                <a:solidFill>
+                  <a:srgbClr val="000000"/>
+                </a:solidFill>
+                <a:uFillTx/>
+              </a:defRPr>
+            </a:pPr>
+            <a:r>
+              <a:rPr lang="en-US" sz="3600" b="1" dirty="0">
+                <a:solidFill>
+                  <a:srgbClr val="57068C"/>
+                </a:solidFill>
+                <a:latin typeface="Arial Unicode MS" panose="020B0604020202020204" pitchFamily="34" charset="-128"/>
+                <a:ea typeface="Arial Unicode MS" panose="020B0604020202020204" pitchFamily="34" charset="-128"/>
+                <a:cs typeface="Arial Unicode MS" panose="020B0604020202020204" pitchFamily="34" charset="-128"/>
+                <a:sym typeface="Iowan Old Style Roman"/>
+              </a:rPr>
+              <a:t>Other Examples?</a:t>
             </a:r>
           </a:p>
         </p:txBody>
@@ -9395,9 +9464,9 @@
               </a:defRPr>
             </a:pPr>
             <a:r>
-              <a:rPr sz="3000" b="1" dirty="0">
-                <a:solidFill>
-                  <a:schemeClr val="tx1"/>
+              <a:rPr sz="3000" b="0" dirty="0">
+                <a:solidFill>
+                  <a:srgbClr val="57068C"/>
                 </a:solidFill>
                 <a:uFill>
                   <a:solidFill>
@@ -10713,9 +10782,25 @@
               </a:defRPr>
             </a:pPr>
             <a:r>
-              <a:rPr sz="3000" b="1" dirty="0">
-                <a:solidFill>
-                  <a:schemeClr val="tx1"/>
+              <a:rPr lang="en-US" sz="3000" b="0" dirty="0">
+                <a:solidFill>
+                  <a:srgbClr val="57068C"/>
+                </a:solidFill>
+                <a:uFill>
+                  <a:solidFill>
+                    <a:srgbClr val="FFFFFF"/>
+                  </a:solidFill>
+                </a:uFill>
+                <a:latin typeface="Arial Unicode MS" panose="020B0604020202020204" pitchFamily="34" charset="-128"/>
+                <a:ea typeface="Arial Unicode MS" panose="020B0604020202020204" pitchFamily="34" charset="-128"/>
+                <a:cs typeface="Arial Unicode MS" panose="020B0604020202020204" pitchFamily="34" charset="-128"/>
+              </a:rPr>
+              <a:t>Relationship </a:t>
+            </a:r>
+            <a:r>
+              <a:rPr sz="3000" b="0" dirty="0">
+                <a:solidFill>
+                  <a:srgbClr val="57068C"/>
                 </a:solidFill>
                 <a:uFill>
                   <a:solidFill>
@@ -10825,7 +10910,7 @@
           <p:nvPr>
             <p:extLst>
               <p:ext uri="{D42A27DB-BD31-4B8C-83A1-F6EECF244321}">
-                <p14:modId xmlns:p14="http://schemas.microsoft.com/office/powerpoint/2010/main" val="2927724691"/>
+                <p14:modId xmlns:p14="http://schemas.microsoft.com/office/powerpoint/2010/main" val="3825583684"/>
               </p:ext>
             </p:extLst>
           </p:nvPr>
@@ -11554,18 +11639,38 @@
                 <a:cs typeface="Arial Unicode MS" panose="020B0604020202020204" pitchFamily="34" charset="-128"/>
                 <a:sym typeface="Arial"/>
               </a:rPr>
-              <a:t>A student can take 0,1, 2, or more courses (many). A course can be taken by 0,1,2 or more students (many). This example, has a </a:t>
-            </a:r>
-          </a:p>
-          <a:p>
-            <a:pPr lvl="0" algn="just">
-              <a:defRPr sz="1800">
-                <a:solidFill>
-                  <a:srgbClr val="000000"/>
-                </a:solidFill>
-                <a:uFillTx/>
-              </a:defRPr>
-            </a:pPr>
+              <a:t>A student can take 0,1, or more courses (many). A course can be taken by 0,1, or more students (many). This example,</a:t>
+            </a:r>
+            <a:r>
+              <a:rPr lang="en-US" dirty="0">
+                <a:solidFill>
+                  <a:schemeClr val="tx1"/>
+                </a:solidFill>
+                <a:uFill>
+                  <a:solidFill/>
+                </a:uFill>
+                <a:latin typeface="Arial Unicode MS" panose="020B0604020202020204" pitchFamily="34" charset="-128"/>
+                <a:ea typeface="Arial Unicode MS" panose="020B0604020202020204" pitchFamily="34" charset="-128"/>
+                <a:cs typeface="Arial Unicode MS" panose="020B0604020202020204" pitchFamily="34" charset="-128"/>
+                <a:sym typeface="Arial"/>
+              </a:rPr>
+              <a:t> the relationship</a:t>
+            </a:r>
+            <a:r>
+              <a:rPr dirty="0">
+                <a:solidFill>
+                  <a:schemeClr val="tx1"/>
+                </a:solidFill>
+                <a:uFill>
+                  <a:solidFill/>
+                </a:uFill>
+                <a:latin typeface="Arial Unicode MS" panose="020B0604020202020204" pitchFamily="34" charset="-128"/>
+                <a:ea typeface="Arial Unicode MS" panose="020B0604020202020204" pitchFamily="34" charset="-128"/>
+                <a:cs typeface="Arial Unicode MS" panose="020B0604020202020204" pitchFamily="34" charset="-128"/>
+                <a:sym typeface="Arial"/>
+              </a:rPr>
+              <a:t> has a </a:t>
+            </a:r>
             <a:r>
               <a:rPr b="1" dirty="0">
                 <a:solidFill>
@@ -11871,7 +11976,7 @@
       </p:grpSpPr>
       <p:sp>
         <p:nvSpPr>
-          <p:cNvPr id="417" name="Shape 417"/>
+          <p:cNvPr id="396" name="Shape 396"/>
           <p:cNvSpPr/>
           <p:nvPr/>
         </p:nvSpPr>
@@ -11917,1406 +12022,9 @@
               </a:defRPr>
             </a:pPr>
             <a:r>
-              <a:rPr sz="3000" b="1" dirty="0">
-                <a:solidFill>
-                  <a:schemeClr val="tx1"/>
-                </a:solidFill>
-                <a:uFill>
-                  <a:solidFill>
-                    <a:srgbClr val="FFFFFF"/>
-                  </a:solidFill>
-                </a:uFill>
-                <a:latin typeface="Arial Unicode MS" panose="020B0604020202020204" pitchFamily="34" charset="-128"/>
-                <a:ea typeface="Arial Unicode MS" panose="020B0604020202020204" pitchFamily="34" charset="-128"/>
-                <a:cs typeface="Arial Unicode MS" panose="020B0604020202020204" pitchFamily="34" charset="-128"/>
-              </a:rPr>
-              <a:t>Cardinality Notation Example</a:t>
-            </a:r>
-          </a:p>
-        </p:txBody>
-      </p:sp>
-      <p:grpSp>
-        <p:nvGrpSpPr>
-          <p:cNvPr id="420" name="Group 420"/>
-          <p:cNvGrpSpPr/>
-          <p:nvPr/>
-        </p:nvGrpSpPr>
-        <p:grpSpPr>
-          <a:xfrm>
-            <a:off x="810986" y="881743"/>
-            <a:ext cx="7467600" cy="3411538"/>
-            <a:chOff x="0" y="0"/>
-            <a:chExt cx="7467600" cy="3411537"/>
-          </a:xfrm>
-        </p:grpSpPr>
-        <p:sp>
-          <p:nvSpPr>
-            <p:cNvPr id="418" name="Shape 418"/>
-            <p:cNvSpPr/>
-            <p:nvPr/>
-          </p:nvSpPr>
-          <p:spPr>
-            <a:xfrm>
-              <a:off x="0" y="0"/>
-              <a:ext cx="7467600" cy="3411538"/>
-            </a:xfrm>
-            <a:prstGeom prst="rect">
-              <a:avLst/>
-            </a:prstGeom>
-            <a:solidFill>
-              <a:srgbClr val="FFFFFF"/>
-            </a:solidFill>
-            <a:ln w="12700" cap="flat">
-              <a:noFill/>
-              <a:miter lim="400000"/>
-            </a:ln>
-            <a:effectLst/>
-          </p:spPr>
-          <p:txBody>
-            <a:bodyPr wrap="square" lIns="0" tIns="0" rIns="0" bIns="0" numCol="1" anchor="t">
-              <a:noAutofit/>
-            </a:bodyPr>
-            <a:lstStyle/>
-            <a:p>
-              <a:pPr lvl="0">
-                <a:defRPr sz="1800">
-                  <a:solidFill>
-                    <a:srgbClr val="000000"/>
-                  </a:solidFill>
-                  <a:latin typeface="+mn-lt"/>
-                  <a:ea typeface="+mn-ea"/>
-                  <a:cs typeface="+mn-cs"/>
-                  <a:sym typeface="Arial"/>
-                </a:defRPr>
-              </a:pPr>
-              <a:endParaRPr dirty="0">
-                <a:solidFill>
-                  <a:schemeClr val="tx1"/>
-                </a:solidFill>
-                <a:latin typeface="Arial Unicode MS" panose="020B0604020202020204" pitchFamily="34" charset="-128"/>
-                <a:ea typeface="Arial Unicode MS" panose="020B0604020202020204" pitchFamily="34" charset="-128"/>
-                <a:cs typeface="Arial Unicode MS" panose="020B0604020202020204" pitchFamily="34" charset="-128"/>
-              </a:endParaRPr>
-            </a:p>
-          </p:txBody>
-        </p:sp>
-        <p:pic>
-          <p:nvPicPr>
-            <p:cNvPr id="419" name="image.pdf"/>
-            <p:cNvPicPr/>
-            <p:nvPr/>
-          </p:nvPicPr>
-          <p:blipFill>
-            <a:blip r:embed="rId3">
-              <a:extLst/>
-            </a:blip>
-            <a:stretch>
-              <a:fillRect/>
-            </a:stretch>
-          </p:blipFill>
-          <p:spPr>
-            <a:xfrm>
-              <a:off x="0" y="0"/>
-              <a:ext cx="7467600" cy="3411538"/>
-            </a:xfrm>
-            <a:prstGeom prst="rect">
-              <a:avLst/>
-            </a:prstGeom>
-            <a:ln w="12700" cap="flat">
-              <a:noFill/>
-              <a:miter lim="400000"/>
-            </a:ln>
-            <a:effectLst/>
-          </p:spPr>
-        </p:pic>
-      </p:grpSp>
-      <p:sp>
-        <p:nvSpPr>
-          <p:cNvPr id="2" name="TextBox 1"/>
-          <p:cNvSpPr txBox="1"/>
-          <p:nvPr/>
-        </p:nvSpPr>
-        <p:spPr>
-          <a:xfrm>
-            <a:off x="92529" y="5176158"/>
-            <a:ext cx="8904514" cy="1631216"/>
-          </a:xfrm>
-          <a:prstGeom prst="rect">
-            <a:avLst/>
-          </a:prstGeom>
-          <a:noFill/>
-        </p:spPr>
-        <p:txBody>
-          <a:bodyPr wrap="square" rtlCol="0">
-            <a:spAutoFit/>
-          </a:bodyPr>
-          <a:lstStyle/>
-          <a:p>
-            <a:r>
-              <a:rPr lang="en-US" dirty="0">
-                <a:solidFill>
-                  <a:schemeClr val="tx1"/>
-                </a:solidFill>
-                <a:latin typeface="Arial Unicode MS" panose="020B0604020202020204" pitchFamily="34" charset="-128"/>
-                <a:ea typeface="Arial Unicode MS" panose="020B0604020202020204" pitchFamily="34" charset="-128"/>
-                <a:cs typeface="Arial Unicode MS" panose="020B0604020202020204" pitchFamily="34" charset="-128"/>
-              </a:rPr>
-              <a:t>Notice that </a:t>
-            </a:r>
-          </a:p>
-          <a:p>
-            <a:pPr marL="342900" indent="-342900">
-              <a:buFont typeface="Arial" panose="020B0604020202020204" pitchFamily="34" charset="0"/>
-              <a:buChar char="•"/>
-            </a:pPr>
-            <a:r>
-              <a:rPr lang="en-US" dirty="0">
-                <a:solidFill>
-                  <a:schemeClr val="tx1"/>
-                </a:solidFill>
-                <a:latin typeface="Arial Unicode MS" panose="020B0604020202020204" pitchFamily="34" charset="-128"/>
-                <a:ea typeface="Arial Unicode MS" panose="020B0604020202020204" pitchFamily="34" charset="-128"/>
-                <a:cs typeface="Arial Unicode MS" panose="020B0604020202020204" pitchFamily="34" charset="-128"/>
-              </a:rPr>
-              <a:t>The “1-1” cardinality next to the Course means that “Each Offering has at least one and at most one Course”</a:t>
-            </a:r>
-          </a:p>
-          <a:p>
-            <a:pPr marL="342900" indent="-342900">
-              <a:buFont typeface="Arial" panose="020B0604020202020204" pitchFamily="34" charset="0"/>
-              <a:buChar char="•"/>
-            </a:pPr>
-            <a:r>
-              <a:rPr lang="en-US" dirty="0">
-                <a:solidFill>
-                  <a:schemeClr val="tx1"/>
-                </a:solidFill>
-                <a:latin typeface="Arial Unicode MS" panose="020B0604020202020204" pitchFamily="34" charset="-128"/>
-                <a:ea typeface="Arial Unicode MS" panose="020B0604020202020204" pitchFamily="34" charset="-128"/>
-                <a:cs typeface="Arial Unicode MS" panose="020B0604020202020204" pitchFamily="34" charset="-128"/>
-              </a:rPr>
-              <a:t>The “0-many” cardinality next to the Offering means that “Each Course may have zero offerings and may have many offerings”</a:t>
-            </a:r>
-          </a:p>
-        </p:txBody>
-      </p:sp>
-    </p:spTree>
-  </p:cSld>
-  <p:clrMapOvr>
-    <a:masterClrMapping/>
-  </p:clrMapOvr>
-  <p:transition spd="med"/>
-</p:sld>
-</file>
-
-<file path=ppt/slides/slide17.xml><?xml version="1.0" encoding="utf-8"?>
-<p:sld xmlns:a="http://schemas.openxmlformats.org/drawingml/2006/main" xmlns:r="http://schemas.openxmlformats.org/officeDocument/2006/relationships" xmlns:p="http://schemas.openxmlformats.org/presentationml/2006/main">
-  <p:cSld>
-    <p:spTree>
-      <p:nvGrpSpPr>
-        <p:cNvPr id="1" name=""/>
-        <p:cNvGrpSpPr/>
-        <p:nvPr/>
-      </p:nvGrpSpPr>
-      <p:grpSpPr>
-        <a:xfrm>
-          <a:off x="0" y="0"/>
-          <a:ext cx="0" cy="0"/>
-          <a:chOff x="0" y="0"/>
-          <a:chExt cx="0" cy="0"/>
-        </a:xfrm>
-      </p:grpSpPr>
-      <p:sp>
-        <p:nvSpPr>
-          <p:cNvPr id="425" name="Shape 425"/>
-          <p:cNvSpPr/>
-          <p:nvPr/>
-        </p:nvSpPr>
-        <p:spPr>
-          <a:xfrm>
-            <a:off x="386308" y="147496"/>
-            <a:ext cx="7757379" cy="461665"/>
-          </a:xfrm>
-          <a:prstGeom prst="rect">
-            <a:avLst/>
-          </a:prstGeom>
-          <a:ln w="12700">
-            <a:miter lim="400000"/>
-          </a:ln>
-          <a:extLst>
-            <a:ext uri="{C572A759-6A51-4108-AA02-DFA0A04FC94B}">
-              <ma14:wrappingTextBoxFlag xmlns="" xmlns:ma14="http://schemas.microsoft.com/office/mac/drawingml/2011/main" val="1"/>
-            </a:ext>
-          </a:extLst>
-        </p:spPr>
-        <p:txBody>
-          <a:bodyPr lIns="0" tIns="0" rIns="0" bIns="0">
-            <a:spAutoFit/>
-          </a:bodyPr>
-          <a:lstStyle>
-            <a:lvl1pPr>
-              <a:defRPr sz="3000" b="1">
-                <a:uFill>
-                  <a:solidFill>
-                    <a:srgbClr val="FFFFFF"/>
-                  </a:solidFill>
-                </a:uFill>
-              </a:defRPr>
-            </a:lvl1pPr>
-          </a:lstStyle>
-          <a:p>
-            <a:pPr lvl="0">
-              <a:defRPr sz="1800" b="0">
-                <a:solidFill>
-                  <a:srgbClr val="000000"/>
-                </a:solidFill>
-                <a:uFillTx/>
-              </a:defRPr>
-            </a:pPr>
-            <a:r>
-              <a:rPr sz="3000" b="1" dirty="0">
-                <a:solidFill>
-                  <a:schemeClr val="tx1"/>
-                </a:solidFill>
-                <a:uFill>
-                  <a:solidFill>
-                    <a:srgbClr val="FFFFFF"/>
-                  </a:solidFill>
-                </a:uFill>
-                <a:latin typeface="Arial Unicode MS" panose="020B0604020202020204" pitchFamily="34" charset="-128"/>
-                <a:ea typeface="Arial Unicode MS" panose="020B0604020202020204" pitchFamily="34" charset="-128"/>
-                <a:cs typeface="Arial Unicode MS" panose="020B0604020202020204" pitchFamily="34" charset="-128"/>
-              </a:rPr>
-              <a:t>Examples of Cardinality Signs</a:t>
-            </a:r>
-          </a:p>
-        </p:txBody>
-      </p:sp>
-      <p:sp>
-        <p:nvSpPr>
-          <p:cNvPr id="426" name="Shape 426"/>
-          <p:cNvSpPr/>
-          <p:nvPr/>
-        </p:nvSpPr>
-        <p:spPr>
-          <a:xfrm>
-            <a:off x="461021" y="839198"/>
-            <a:ext cx="7590195" cy="5870838"/>
-          </a:xfrm>
-          <a:prstGeom prst="rect">
-            <a:avLst/>
-          </a:prstGeom>
-          <a:ln w="12700">
-            <a:miter lim="400000"/>
-          </a:ln>
-          <a:extLst>
-            <a:ext uri="{C572A759-6A51-4108-AA02-DFA0A04FC94B}">
-              <ma14:wrappingTextBoxFlag xmlns="" xmlns:ma14="http://schemas.microsoft.com/office/mac/drawingml/2011/main" val="1"/>
-            </a:ext>
-          </a:extLst>
-        </p:spPr>
-        <p:txBody>
-          <a:bodyPr lIns="0" tIns="0" rIns="0" bIns="0">
-            <a:spAutoFit/>
-          </a:bodyPr>
-          <a:lstStyle/>
-          <a:p>
-            <a:pPr marL="342900" lvl="0" indent="-304800" algn="just">
-              <a:spcBef>
-                <a:spcPts val="700"/>
-              </a:spcBef>
-              <a:buSzPct val="50000"/>
-              <a:buBlip>
-                <a:blip r:embed="rId3"/>
-              </a:buBlip>
-              <a:defRPr sz="1800">
-                <a:solidFill>
-                  <a:srgbClr val="000000"/>
-                </a:solidFill>
-                <a:uFillTx/>
-              </a:defRPr>
-            </a:pPr>
-            <a:r>
-              <a:rPr lang="en-US" sz="2600" u="sng" dirty="0">
-                <a:solidFill>
-                  <a:schemeClr val="tx1"/>
-                </a:solidFill>
-                <a:uFill>
-                  <a:solidFill/>
-                </a:uFill>
-                <a:latin typeface="Arial Unicode MS" panose="020B0604020202020204" pitchFamily="34" charset="-128"/>
-                <a:ea typeface="Arial Unicode MS" panose="020B0604020202020204" pitchFamily="34" charset="-128"/>
-                <a:cs typeface="Arial Unicode MS" panose="020B0604020202020204" pitchFamily="34" charset="-128"/>
-                <a:sym typeface="Iowan Old Style Roman"/>
-              </a:rPr>
-              <a:t>Minimum</a:t>
-            </a:r>
-            <a:r>
-              <a:rPr sz="2600" u="sng" dirty="0">
-                <a:solidFill>
-                  <a:schemeClr val="tx1"/>
-                </a:solidFill>
-                <a:uFill>
-                  <a:solidFill/>
-                </a:uFill>
-                <a:latin typeface="Arial Unicode MS" panose="020B0604020202020204" pitchFamily="34" charset="-128"/>
-                <a:ea typeface="Arial Unicode MS" panose="020B0604020202020204" pitchFamily="34" charset="-128"/>
-                <a:cs typeface="Arial Unicode MS" panose="020B0604020202020204" pitchFamily="34" charset="-128"/>
-                <a:sym typeface="Iowan Old Style Roman"/>
-              </a:rPr>
-              <a:t>-one</a:t>
-            </a:r>
-            <a:r>
-              <a:rPr lang="en-US" sz="2600" u="sng" dirty="0">
-                <a:solidFill>
-                  <a:schemeClr val="tx1"/>
-                </a:solidFill>
-                <a:uFill>
-                  <a:solidFill/>
-                </a:uFill>
-                <a:latin typeface="Arial Unicode MS" panose="020B0604020202020204" pitchFamily="34" charset="-128"/>
-                <a:ea typeface="Arial Unicode MS" panose="020B0604020202020204" pitchFamily="34" charset="-128"/>
-                <a:cs typeface="Arial Unicode MS" panose="020B0604020202020204" pitchFamily="34" charset="-128"/>
-                <a:sym typeface="Iowan Old Style Roman"/>
-              </a:rPr>
-              <a:t>, Maximum-one</a:t>
-            </a:r>
-            <a:r>
-              <a:rPr sz="2600" dirty="0">
-                <a:solidFill>
-                  <a:schemeClr val="tx1"/>
-                </a:solidFill>
-                <a:uFill>
-                  <a:solidFill/>
-                </a:uFill>
-                <a:latin typeface="Arial Unicode MS" panose="020B0604020202020204" pitchFamily="34" charset="-128"/>
-                <a:ea typeface="Arial Unicode MS" panose="020B0604020202020204" pitchFamily="34" charset="-128"/>
-                <a:cs typeface="Arial Unicode MS" panose="020B0604020202020204" pitchFamily="34" charset="-128"/>
-                <a:sym typeface="Iowan Old Style Roman"/>
-              </a:rPr>
-              <a:t> ( || )</a:t>
-            </a:r>
-            <a:r>
-              <a:rPr lang="en-US" sz="2600" dirty="0">
-                <a:solidFill>
-                  <a:schemeClr val="tx1"/>
-                </a:solidFill>
-                <a:uFill>
-                  <a:solidFill/>
-                </a:uFill>
-                <a:latin typeface="Arial Unicode MS" panose="020B0604020202020204" pitchFamily="34" charset="-128"/>
-                <a:ea typeface="Arial Unicode MS" panose="020B0604020202020204" pitchFamily="34" charset="-128"/>
-                <a:cs typeface="Arial Unicode MS" panose="020B0604020202020204" pitchFamily="34" charset="-128"/>
-                <a:sym typeface="Iowan Old Style Roman"/>
-              </a:rPr>
-              <a:t>:</a:t>
-            </a:r>
-            <a:r>
-              <a:rPr sz="2600" dirty="0">
-                <a:solidFill>
-                  <a:schemeClr val="tx1"/>
-                </a:solidFill>
-                <a:uFill>
-                  <a:solidFill/>
-                </a:uFill>
-                <a:latin typeface="Arial Unicode MS" panose="020B0604020202020204" pitchFamily="34" charset="-128"/>
-                <a:ea typeface="Arial Unicode MS" panose="020B0604020202020204" pitchFamily="34" charset="-128"/>
-                <a:cs typeface="Arial Unicode MS" panose="020B0604020202020204" pitchFamily="34" charset="-128"/>
-                <a:sym typeface="Iowan Old Style Roman"/>
-              </a:rPr>
-              <a:t> there must be exactly 1 relationship.  e.g., a professor must have </a:t>
-            </a:r>
-            <a:r>
-              <a:rPr lang="en-US" sz="2600" dirty="0">
-                <a:solidFill>
-                  <a:schemeClr val="tx1"/>
-                </a:solidFill>
-                <a:uFill>
-                  <a:solidFill/>
-                </a:uFill>
-                <a:latin typeface="Arial Unicode MS" panose="020B0604020202020204" pitchFamily="34" charset="-128"/>
-                <a:ea typeface="Arial Unicode MS" panose="020B0604020202020204" pitchFamily="34" charset="-128"/>
-                <a:cs typeface="Arial Unicode MS" panose="020B0604020202020204" pitchFamily="34" charset="-128"/>
-                <a:sym typeface="Iowan Old Style Roman"/>
-              </a:rPr>
-              <a:t>an office (minimum one) and </a:t>
-            </a:r>
-            <a:r>
-              <a:rPr sz="2600" dirty="0">
-                <a:solidFill>
-                  <a:schemeClr val="tx1"/>
-                </a:solidFill>
-                <a:uFill>
-                  <a:solidFill/>
-                </a:uFill>
-                <a:latin typeface="Arial Unicode MS" panose="020B0604020202020204" pitchFamily="34" charset="-128"/>
-                <a:ea typeface="Arial Unicode MS" panose="020B0604020202020204" pitchFamily="34" charset="-128"/>
-                <a:cs typeface="Arial Unicode MS" panose="020B0604020202020204" pitchFamily="34" charset="-128"/>
-                <a:sym typeface="Iowan Old Style Roman"/>
-              </a:rPr>
-              <a:t>exactly </a:t>
-            </a:r>
-            <a:r>
-              <a:rPr lang="en-US" sz="2600" dirty="0">
-                <a:solidFill>
-                  <a:schemeClr val="tx1"/>
-                </a:solidFill>
-                <a:uFillTx/>
-                <a:latin typeface="Arial Unicode MS" panose="020B0604020202020204" pitchFamily="34" charset="-128"/>
-                <a:ea typeface="Arial Unicode MS" panose="020B0604020202020204" pitchFamily="34" charset="-128"/>
-                <a:cs typeface="Arial Unicode MS" panose="020B0604020202020204" pitchFamily="34" charset="-128"/>
-                <a:sym typeface="Iowan Old Style Roman"/>
-              </a:rPr>
-              <a:t>one</a:t>
-            </a:r>
-            <a:r>
-              <a:rPr sz="2600" dirty="0">
-                <a:solidFill>
-                  <a:schemeClr val="tx1"/>
-                </a:solidFill>
-                <a:uFill>
-                  <a:solidFill/>
-                </a:uFill>
-                <a:latin typeface="Arial Unicode MS" panose="020B0604020202020204" pitchFamily="34" charset="-128"/>
-                <a:ea typeface="Arial Unicode MS" panose="020B0604020202020204" pitchFamily="34" charset="-128"/>
-                <a:cs typeface="Arial Unicode MS" panose="020B0604020202020204" pitchFamily="34" charset="-128"/>
-                <a:sym typeface="Iowan Old Style Roman"/>
-              </a:rPr>
-              <a:t> office</a:t>
-            </a:r>
-            <a:r>
-              <a:rPr lang="en-US" sz="2600" dirty="0">
-                <a:solidFill>
-                  <a:schemeClr val="tx1"/>
-                </a:solidFill>
-                <a:uFill>
-                  <a:solidFill/>
-                </a:uFill>
-                <a:latin typeface="Arial Unicode MS" panose="020B0604020202020204" pitchFamily="34" charset="-128"/>
-                <a:ea typeface="Arial Unicode MS" panose="020B0604020202020204" pitchFamily="34" charset="-128"/>
-                <a:cs typeface="Arial Unicode MS" panose="020B0604020202020204" pitchFamily="34" charset="-128"/>
-                <a:sym typeface="Iowan Old Style Roman"/>
-              </a:rPr>
-              <a:t> (maximum one)</a:t>
-            </a:r>
-            <a:r>
-              <a:rPr sz="2600" dirty="0">
-                <a:solidFill>
-                  <a:schemeClr val="tx1"/>
-                </a:solidFill>
-                <a:uFill>
-                  <a:solidFill/>
-                </a:uFill>
-                <a:latin typeface="Arial Unicode MS" panose="020B0604020202020204" pitchFamily="34" charset="-128"/>
-                <a:ea typeface="Arial Unicode MS" panose="020B0604020202020204" pitchFamily="34" charset="-128"/>
-                <a:cs typeface="Arial Unicode MS" panose="020B0604020202020204" pitchFamily="34" charset="-128"/>
-                <a:sym typeface="Iowan Old Style Roman"/>
-              </a:rPr>
-              <a:t>.</a:t>
-            </a:r>
-          </a:p>
-          <a:p>
-            <a:pPr marL="342900" lvl="0" indent="-304800" algn="just">
-              <a:spcBef>
-                <a:spcPts val="700"/>
-              </a:spcBef>
-              <a:buSzPct val="50000"/>
-              <a:buBlip>
-                <a:blip r:embed="rId3"/>
-              </a:buBlip>
-              <a:defRPr sz="1800">
-                <a:solidFill>
-                  <a:srgbClr val="000000"/>
-                </a:solidFill>
-                <a:uFillTx/>
-              </a:defRPr>
-            </a:pPr>
-            <a:r>
-              <a:rPr lang="en-US" sz="2600" u="sng" dirty="0">
-                <a:solidFill>
-                  <a:schemeClr val="tx1"/>
-                </a:solidFill>
-                <a:latin typeface="Arial Unicode MS" panose="020B0604020202020204" pitchFamily="34" charset="-128"/>
-                <a:ea typeface="Arial Unicode MS" panose="020B0604020202020204" pitchFamily="34" charset="-128"/>
-                <a:cs typeface="Arial Unicode MS" panose="020B0604020202020204" pitchFamily="34" charset="-128"/>
-                <a:sym typeface="Iowan Old Style Roman"/>
-              </a:rPr>
-              <a:t>Minimum-o</a:t>
-            </a:r>
-            <a:r>
-              <a:rPr sz="2600" u="sng" dirty="0">
-                <a:solidFill>
-                  <a:schemeClr val="tx1"/>
-                </a:solidFill>
-                <a:uFill>
-                  <a:solidFill/>
-                </a:uFill>
-                <a:latin typeface="Arial Unicode MS" panose="020B0604020202020204" pitchFamily="34" charset="-128"/>
-                <a:ea typeface="Arial Unicode MS" panose="020B0604020202020204" pitchFamily="34" charset="-128"/>
-                <a:cs typeface="Arial Unicode MS" panose="020B0604020202020204" pitchFamily="34" charset="-128"/>
-                <a:sym typeface="Iowan Old Style Roman"/>
-              </a:rPr>
-              <a:t>ne</a:t>
-            </a:r>
-            <a:r>
-              <a:rPr lang="en-US" sz="2600" u="sng" dirty="0">
-                <a:solidFill>
-                  <a:schemeClr val="tx1"/>
-                </a:solidFill>
-                <a:uFill>
-                  <a:solidFill/>
-                </a:uFill>
-                <a:latin typeface="Arial Unicode MS" panose="020B0604020202020204" pitchFamily="34" charset="-128"/>
-                <a:ea typeface="Arial Unicode MS" panose="020B0604020202020204" pitchFamily="34" charset="-128"/>
-                <a:cs typeface="Arial Unicode MS" panose="020B0604020202020204" pitchFamily="34" charset="-128"/>
-                <a:sym typeface="Iowan Old Style Roman"/>
-              </a:rPr>
-              <a:t>, Maximum</a:t>
-            </a:r>
-            <a:r>
-              <a:rPr sz="2600" u="sng" dirty="0">
-                <a:solidFill>
-                  <a:schemeClr val="tx1"/>
-                </a:solidFill>
-                <a:uFill>
-                  <a:solidFill/>
-                </a:uFill>
-                <a:latin typeface="Arial Unicode MS" panose="020B0604020202020204" pitchFamily="34" charset="-128"/>
-                <a:ea typeface="Arial Unicode MS" panose="020B0604020202020204" pitchFamily="34" charset="-128"/>
-                <a:cs typeface="Arial Unicode MS" panose="020B0604020202020204" pitchFamily="34" charset="-128"/>
-                <a:sym typeface="Iowan Old Style Roman"/>
-              </a:rPr>
-              <a:t>-many</a:t>
-            </a:r>
-            <a:r>
-              <a:rPr sz="2600" dirty="0">
-                <a:solidFill>
-                  <a:schemeClr val="tx1"/>
-                </a:solidFill>
-                <a:uFill>
-                  <a:solidFill/>
-                </a:uFill>
-                <a:latin typeface="Arial Unicode MS" panose="020B0604020202020204" pitchFamily="34" charset="-128"/>
-                <a:ea typeface="Arial Unicode MS" panose="020B0604020202020204" pitchFamily="34" charset="-128"/>
-                <a:cs typeface="Arial Unicode MS" panose="020B0604020202020204" pitchFamily="34" charset="-128"/>
-                <a:sym typeface="Iowan Old Style Roman"/>
-              </a:rPr>
-              <a:t> ( |   ). e.g., each department </a:t>
-            </a:r>
-            <a:r>
-              <a:rPr lang="en-US" sz="2600" dirty="0">
-                <a:solidFill>
-                  <a:schemeClr val="tx1"/>
-                </a:solidFill>
-                <a:uFill>
-                  <a:solidFill/>
-                </a:uFill>
-                <a:latin typeface="Arial Unicode MS" panose="020B0604020202020204" pitchFamily="34" charset="-128"/>
-                <a:ea typeface="Arial Unicode MS" panose="020B0604020202020204" pitchFamily="34" charset="-128"/>
-                <a:cs typeface="Arial Unicode MS" panose="020B0604020202020204" pitchFamily="34" charset="-128"/>
-                <a:sym typeface="Iowan Old Style Roman"/>
-              </a:rPr>
-              <a:t>must have at least one instructor (minimum-one) but may also have</a:t>
-            </a:r>
-            <a:r>
-              <a:rPr sz="2600" dirty="0">
-                <a:solidFill>
-                  <a:schemeClr val="tx1"/>
-                </a:solidFill>
-                <a:uFill>
-                  <a:solidFill/>
-                </a:uFill>
-                <a:latin typeface="Arial Unicode MS" panose="020B0604020202020204" pitchFamily="34" charset="-128"/>
-                <a:ea typeface="Arial Unicode MS" panose="020B0604020202020204" pitchFamily="34" charset="-128"/>
-                <a:cs typeface="Arial Unicode MS" panose="020B0604020202020204" pitchFamily="34" charset="-128"/>
-                <a:sym typeface="Iowan Old Style Roman"/>
-              </a:rPr>
-              <a:t> many instructors (but at least one!)</a:t>
-            </a:r>
-          </a:p>
-          <a:p>
-            <a:pPr marL="342900" lvl="0" indent="-304800" algn="just">
-              <a:spcBef>
-                <a:spcPts val="700"/>
-              </a:spcBef>
-              <a:buSzPct val="50000"/>
-              <a:buBlip>
-                <a:blip r:embed="rId3"/>
-              </a:buBlip>
-              <a:defRPr sz="1800">
-                <a:solidFill>
-                  <a:srgbClr val="000000"/>
-                </a:solidFill>
-                <a:uFillTx/>
-              </a:defRPr>
-            </a:pPr>
-            <a:r>
-              <a:rPr lang="en-US" sz="2600" u="sng" dirty="0">
-                <a:solidFill>
-                  <a:schemeClr val="tx1"/>
-                </a:solidFill>
-                <a:uFill>
-                  <a:solidFill/>
-                </a:uFill>
-                <a:latin typeface="Arial Unicode MS" panose="020B0604020202020204" pitchFamily="34" charset="-128"/>
-                <a:ea typeface="Arial Unicode MS" panose="020B0604020202020204" pitchFamily="34" charset="-128"/>
-                <a:cs typeface="Arial Unicode MS" panose="020B0604020202020204" pitchFamily="34" charset="-128"/>
-                <a:sym typeface="Iowan Old Style Roman"/>
-              </a:rPr>
-              <a:t>Minimum-z</a:t>
-            </a:r>
-            <a:r>
-              <a:rPr sz="2600" u="sng" dirty="0">
-                <a:solidFill>
-                  <a:schemeClr val="tx1"/>
-                </a:solidFill>
-                <a:uFill>
-                  <a:solidFill/>
-                </a:uFill>
-                <a:latin typeface="Arial Unicode MS" panose="020B0604020202020204" pitchFamily="34" charset="-128"/>
-                <a:ea typeface="Arial Unicode MS" panose="020B0604020202020204" pitchFamily="34" charset="-128"/>
-                <a:cs typeface="Arial Unicode MS" panose="020B0604020202020204" pitchFamily="34" charset="-128"/>
-                <a:sym typeface="Iowan Old Style Roman"/>
-              </a:rPr>
-              <a:t>ero</a:t>
-            </a:r>
-            <a:r>
-              <a:rPr lang="en-US" sz="2600" u="sng" dirty="0">
-                <a:solidFill>
-                  <a:schemeClr val="tx1"/>
-                </a:solidFill>
-                <a:uFill>
-                  <a:solidFill/>
-                </a:uFill>
-                <a:latin typeface="Arial Unicode MS" panose="020B0604020202020204" pitchFamily="34" charset="-128"/>
-                <a:ea typeface="Arial Unicode MS" panose="020B0604020202020204" pitchFamily="34" charset="-128"/>
-                <a:cs typeface="Arial Unicode MS" panose="020B0604020202020204" pitchFamily="34" charset="-128"/>
-                <a:sym typeface="Iowan Old Style Roman"/>
-              </a:rPr>
-              <a:t>, Maximum-</a:t>
-            </a:r>
-            <a:r>
-              <a:rPr sz="2600" u="sng" dirty="0">
-                <a:solidFill>
-                  <a:schemeClr val="tx1"/>
-                </a:solidFill>
-                <a:uFill>
-                  <a:solidFill/>
-                </a:uFill>
-                <a:latin typeface="Arial Unicode MS" panose="020B0604020202020204" pitchFamily="34" charset="-128"/>
-                <a:ea typeface="Arial Unicode MS" panose="020B0604020202020204" pitchFamily="34" charset="-128"/>
-                <a:cs typeface="Arial Unicode MS" panose="020B0604020202020204" pitchFamily="34" charset="-128"/>
-                <a:sym typeface="Iowan Old Style Roman"/>
-              </a:rPr>
-              <a:t>many</a:t>
-            </a:r>
-            <a:r>
-              <a:rPr sz="2600" dirty="0">
-                <a:solidFill>
-                  <a:schemeClr val="tx1"/>
-                </a:solidFill>
-                <a:uFill>
-                  <a:solidFill/>
-                </a:uFill>
-                <a:latin typeface="Arial Unicode MS" panose="020B0604020202020204" pitchFamily="34" charset="-128"/>
-                <a:ea typeface="Arial Unicode MS" panose="020B0604020202020204" pitchFamily="34" charset="-128"/>
-                <a:cs typeface="Arial Unicode MS" panose="020B0604020202020204" pitchFamily="34" charset="-128"/>
-                <a:sym typeface="Iowan Old Style Roman"/>
-              </a:rPr>
-              <a:t> (   ). e.g., each </a:t>
-            </a:r>
-            <a:r>
-              <a:rPr lang="en-US" sz="2600" dirty="0">
-                <a:solidFill>
-                  <a:schemeClr val="tx1"/>
-                </a:solidFill>
-                <a:uFill>
-                  <a:solidFill/>
-                </a:uFill>
-                <a:latin typeface="Arial Unicode MS" panose="020B0604020202020204" pitchFamily="34" charset="-128"/>
-                <a:ea typeface="Arial Unicode MS" panose="020B0604020202020204" pitchFamily="34" charset="-128"/>
-                <a:cs typeface="Arial Unicode MS" panose="020B0604020202020204" pitchFamily="34" charset="-128"/>
-                <a:sym typeface="Iowan Old Style Roman"/>
-              </a:rPr>
-              <a:t>person can have a maximum of many phones (maximum-many) but may also have no phone number (minimum-zero)</a:t>
-            </a:r>
-          </a:p>
-          <a:p>
-            <a:pPr marL="342900" lvl="0" indent="-304800" algn="just">
-              <a:spcBef>
-                <a:spcPts val="700"/>
-              </a:spcBef>
-              <a:buSzPct val="50000"/>
-              <a:buBlip>
-                <a:blip r:embed="rId3"/>
-              </a:buBlip>
-              <a:defRPr sz="1800">
-                <a:solidFill>
-                  <a:srgbClr val="000000"/>
-                </a:solidFill>
-                <a:uFillTx/>
-              </a:defRPr>
-            </a:pPr>
-            <a:r>
-              <a:rPr lang="en-US" sz="2600" dirty="0">
-                <a:solidFill>
-                  <a:schemeClr val="tx1"/>
-                </a:solidFill>
-                <a:latin typeface="Arial Unicode MS" panose="020B0604020202020204" pitchFamily="34" charset="-128"/>
-                <a:ea typeface="Arial Unicode MS" panose="020B0604020202020204" pitchFamily="34" charset="-128"/>
-                <a:cs typeface="Arial Unicode MS" panose="020B0604020202020204" pitchFamily="34" charset="-128"/>
-                <a:sym typeface="Iowan Old Style Roman"/>
-              </a:rPr>
-              <a:t>Minimum-zero, Maximum-one (0 ): </a:t>
-            </a:r>
-            <a:r>
-              <a:rPr lang="en-US" sz="2600" dirty="0" err="1">
-                <a:solidFill>
-                  <a:schemeClr val="tx1"/>
-                </a:solidFill>
-                <a:latin typeface="Arial Unicode MS" panose="020B0604020202020204" pitchFamily="34" charset="-128"/>
-                <a:ea typeface="Arial Unicode MS" panose="020B0604020202020204" pitchFamily="34" charset="-128"/>
-                <a:cs typeface="Arial Unicode MS" panose="020B0604020202020204" pitchFamily="34" charset="-128"/>
-                <a:sym typeface="Iowan Old Style Roman"/>
-              </a:rPr>
-              <a:t>eg</a:t>
-            </a:r>
-            <a:r>
-              <a:rPr lang="en-US" sz="2600" dirty="0">
-                <a:solidFill>
-                  <a:schemeClr val="tx1"/>
-                </a:solidFill>
-                <a:latin typeface="Arial Unicode MS" panose="020B0604020202020204" pitchFamily="34" charset="-128"/>
-                <a:ea typeface="Arial Unicode MS" panose="020B0604020202020204" pitchFamily="34" charset="-128"/>
-                <a:cs typeface="Arial Unicode MS" panose="020B0604020202020204" pitchFamily="34" charset="-128"/>
-                <a:sym typeface="Iowan Old Style Roman"/>
-              </a:rPr>
-              <a:t> a student may have 0 or 1 university email accounts</a:t>
-            </a:r>
-            <a:endParaRPr sz="2600" dirty="0">
-              <a:solidFill>
-                <a:schemeClr val="tx1"/>
-              </a:solidFill>
-              <a:uFill>
-                <a:solidFill/>
-              </a:uFill>
-              <a:latin typeface="Arial Unicode MS" panose="020B0604020202020204" pitchFamily="34" charset="-128"/>
-              <a:ea typeface="Arial Unicode MS" panose="020B0604020202020204" pitchFamily="34" charset="-128"/>
-              <a:cs typeface="Arial Unicode MS" panose="020B0604020202020204" pitchFamily="34" charset="-128"/>
-              <a:sym typeface="Iowan Old Style Roman"/>
-            </a:endParaRPr>
-          </a:p>
-        </p:txBody>
-      </p:sp>
-      <p:sp>
-        <p:nvSpPr>
-          <p:cNvPr id="427" name="Shape 427"/>
-          <p:cNvSpPr/>
-          <p:nvPr/>
-        </p:nvSpPr>
-        <p:spPr>
-          <a:xfrm>
-            <a:off x="5800776" y="4348075"/>
-            <a:ext cx="139344" cy="201586"/>
-          </a:xfrm>
-          <a:custGeom>
-            <a:avLst/>
-            <a:gdLst/>
-            <a:ahLst/>
-            <a:cxnLst>
-              <a:cxn ang="0">
-                <a:pos x="wd2" y="hd2"/>
-              </a:cxn>
-              <a:cxn ang="5400000">
-                <a:pos x="wd2" y="hd2"/>
-              </a:cxn>
-              <a:cxn ang="10800000">
-                <a:pos x="wd2" y="hd2"/>
-              </a:cxn>
-              <a:cxn ang="16200000">
-                <a:pos x="wd2" y="hd2"/>
-              </a:cxn>
-            </a:cxnLst>
-            <a:rect l="0" t="0" r="r" b="b"/>
-            <a:pathLst>
-              <a:path w="19679" h="19679" extrusionOk="0">
-                <a:moveTo>
-                  <a:pt x="16796" y="2882"/>
-                </a:moveTo>
-                <a:cubicBezTo>
-                  <a:pt x="20639" y="6724"/>
-                  <a:pt x="20639" y="12954"/>
-                  <a:pt x="16796" y="16796"/>
-                </a:cubicBezTo>
-                <a:cubicBezTo>
-                  <a:pt x="12954" y="20639"/>
-                  <a:pt x="6724" y="20639"/>
-                  <a:pt x="2882" y="16796"/>
-                </a:cubicBezTo>
-                <a:cubicBezTo>
-                  <a:pt x="-961" y="12954"/>
-                  <a:pt x="-961" y="6724"/>
-                  <a:pt x="2882" y="2882"/>
-                </a:cubicBezTo>
-                <a:cubicBezTo>
-                  <a:pt x="6724" y="-961"/>
-                  <a:pt x="12954" y="-961"/>
-                  <a:pt x="16796" y="2882"/>
-                </a:cubicBezTo>
-                <a:close/>
-              </a:path>
-            </a:pathLst>
-          </a:custGeom>
-          <a:ln w="25400">
-            <a:solidFill>
-              <a:srgbClr val="011993"/>
-            </a:solidFill>
-            <a:round/>
-          </a:ln>
-        </p:spPr>
-        <p:txBody>
-          <a:bodyPr lIns="0" tIns="0" rIns="0" bIns="0"/>
-          <a:lstStyle/>
-          <a:p>
-            <a:pPr lvl="0">
-              <a:defRPr sz="1800">
-                <a:solidFill>
-                  <a:srgbClr val="011993"/>
-                </a:solidFill>
-                <a:latin typeface="+mn-lt"/>
-                <a:ea typeface="+mn-ea"/>
-                <a:cs typeface="+mn-cs"/>
-                <a:sym typeface="Arial"/>
-              </a:defRPr>
-            </a:pPr>
-            <a:endParaRPr dirty="0">
-              <a:solidFill>
-                <a:schemeClr val="tx1"/>
-              </a:solidFill>
-              <a:latin typeface="Arial Unicode MS" panose="020B0604020202020204" pitchFamily="34" charset="-128"/>
-              <a:ea typeface="Arial Unicode MS" panose="020B0604020202020204" pitchFamily="34" charset="-128"/>
-              <a:cs typeface="Arial Unicode MS" panose="020B0604020202020204" pitchFamily="34" charset="-128"/>
-            </a:endParaRPr>
-          </a:p>
-        </p:txBody>
-      </p:sp>
-      <p:sp>
-        <p:nvSpPr>
-          <p:cNvPr id="428" name="Shape 428"/>
-          <p:cNvSpPr/>
-          <p:nvPr/>
-        </p:nvSpPr>
-        <p:spPr>
-          <a:xfrm>
-            <a:off x="5968259" y="4442183"/>
-            <a:ext cx="164744" cy="1"/>
-          </a:xfrm>
-          <a:prstGeom prst="line">
-            <a:avLst/>
-          </a:prstGeom>
-          <a:ln w="25400">
-            <a:solidFill>
-              <a:srgbClr val="011993"/>
-            </a:solidFill>
-            <a:round/>
-          </a:ln>
-          <a:effectLst>
-            <a:outerShdw blurRad="38100" dist="20000" dir="5400000" rotWithShape="0">
-              <a:srgbClr val="000000">
-                <a:alpha val="38000"/>
-              </a:srgbClr>
-            </a:outerShdw>
-          </a:effectLst>
-        </p:spPr>
-        <p:txBody>
-          <a:bodyPr lIns="0" tIns="0" rIns="0" bIns="0"/>
-          <a:lstStyle/>
-          <a:p>
-            <a:pPr lvl="0" defTabSz="457200">
-              <a:defRPr sz="1200">
-                <a:solidFill>
-                  <a:srgbClr val="000000"/>
-                </a:solidFill>
-                <a:uFillTx/>
-                <a:latin typeface="+mj-lt"/>
-                <a:ea typeface="+mj-ea"/>
-                <a:cs typeface="+mj-cs"/>
-                <a:sym typeface="Helvetica"/>
-              </a:defRPr>
-            </a:pPr>
-            <a:endParaRPr dirty="0">
-              <a:solidFill>
-                <a:schemeClr val="tx1"/>
-              </a:solidFill>
-              <a:latin typeface="Arial Unicode MS" panose="020B0604020202020204" pitchFamily="34" charset="-128"/>
-              <a:ea typeface="Arial Unicode MS" panose="020B0604020202020204" pitchFamily="34" charset="-128"/>
-              <a:cs typeface="Arial Unicode MS" panose="020B0604020202020204" pitchFamily="34" charset="-128"/>
-            </a:endParaRPr>
-          </a:p>
-        </p:txBody>
-      </p:sp>
-      <p:sp>
-        <p:nvSpPr>
-          <p:cNvPr id="429" name="Shape 429"/>
-          <p:cNvSpPr/>
-          <p:nvPr/>
-        </p:nvSpPr>
-        <p:spPr>
-          <a:xfrm flipV="1">
-            <a:off x="5965530" y="4270961"/>
-            <a:ext cx="170201" cy="170200"/>
-          </a:xfrm>
-          <a:prstGeom prst="line">
-            <a:avLst/>
-          </a:prstGeom>
-          <a:ln w="25400">
-            <a:solidFill>
-              <a:srgbClr val="011993"/>
-            </a:solidFill>
-            <a:round/>
-          </a:ln>
-          <a:effectLst>
-            <a:outerShdw blurRad="38100" dist="20000" dir="5400000" rotWithShape="0">
-              <a:srgbClr val="000000">
-                <a:alpha val="38000"/>
-              </a:srgbClr>
-            </a:outerShdw>
-          </a:effectLst>
-        </p:spPr>
-        <p:txBody>
-          <a:bodyPr lIns="0" tIns="0" rIns="0" bIns="0"/>
-          <a:lstStyle/>
-          <a:p>
-            <a:pPr lvl="0" defTabSz="457200">
-              <a:defRPr sz="1200">
-                <a:solidFill>
-                  <a:srgbClr val="000000"/>
-                </a:solidFill>
-                <a:uFillTx/>
-                <a:latin typeface="+mj-lt"/>
-                <a:ea typeface="+mj-ea"/>
-                <a:cs typeface="+mj-cs"/>
-                <a:sym typeface="Helvetica"/>
-              </a:defRPr>
-            </a:pPr>
-            <a:endParaRPr dirty="0">
-              <a:solidFill>
-                <a:schemeClr val="tx1"/>
-              </a:solidFill>
-              <a:latin typeface="Arial Unicode MS" panose="020B0604020202020204" pitchFamily="34" charset="-128"/>
-              <a:ea typeface="Arial Unicode MS" panose="020B0604020202020204" pitchFamily="34" charset="-128"/>
-              <a:cs typeface="Arial Unicode MS" panose="020B0604020202020204" pitchFamily="34" charset="-128"/>
-            </a:endParaRPr>
-          </a:p>
-        </p:txBody>
-      </p:sp>
-      <p:sp>
-        <p:nvSpPr>
-          <p:cNvPr id="430" name="Shape 430"/>
-          <p:cNvSpPr/>
-          <p:nvPr/>
-        </p:nvSpPr>
-        <p:spPr>
-          <a:xfrm flipH="1" flipV="1">
-            <a:off x="5961958" y="4436730"/>
-            <a:ext cx="177346" cy="177346"/>
-          </a:xfrm>
-          <a:prstGeom prst="line">
-            <a:avLst/>
-          </a:prstGeom>
-          <a:ln w="25400">
-            <a:solidFill>
-              <a:srgbClr val="011993"/>
-            </a:solidFill>
-            <a:round/>
-          </a:ln>
-          <a:effectLst>
-            <a:outerShdw blurRad="38100" dist="20000" dir="5400000" rotWithShape="0">
-              <a:srgbClr val="000000">
-                <a:alpha val="38000"/>
-              </a:srgbClr>
-            </a:outerShdw>
-          </a:effectLst>
-        </p:spPr>
-        <p:txBody>
-          <a:bodyPr lIns="0" tIns="0" rIns="0" bIns="0"/>
-          <a:lstStyle/>
-          <a:p>
-            <a:pPr lvl="0" defTabSz="457200">
-              <a:defRPr sz="1200">
-                <a:solidFill>
-                  <a:srgbClr val="000000"/>
-                </a:solidFill>
-                <a:uFillTx/>
-                <a:latin typeface="+mj-lt"/>
-                <a:ea typeface="+mj-ea"/>
-                <a:cs typeface="+mj-cs"/>
-                <a:sym typeface="Helvetica"/>
-              </a:defRPr>
-            </a:pPr>
-            <a:endParaRPr dirty="0">
-              <a:solidFill>
-                <a:schemeClr val="tx1"/>
-              </a:solidFill>
-              <a:latin typeface="Arial Unicode MS" panose="020B0604020202020204" pitchFamily="34" charset="-128"/>
-              <a:ea typeface="Arial Unicode MS" panose="020B0604020202020204" pitchFamily="34" charset="-128"/>
-              <a:cs typeface="Arial Unicode MS" panose="020B0604020202020204" pitchFamily="34" charset="-128"/>
-            </a:endParaRPr>
-          </a:p>
-        </p:txBody>
-      </p:sp>
-      <p:sp>
-        <p:nvSpPr>
-          <p:cNvPr id="431" name="Shape 431"/>
-          <p:cNvSpPr/>
-          <p:nvPr/>
-        </p:nvSpPr>
-        <p:spPr>
-          <a:xfrm>
-            <a:off x="5791807" y="2740484"/>
-            <a:ext cx="164744" cy="1"/>
-          </a:xfrm>
-          <a:prstGeom prst="line">
-            <a:avLst/>
-          </a:prstGeom>
-          <a:ln w="25400">
-            <a:solidFill>
-              <a:srgbClr val="011993"/>
-            </a:solidFill>
-            <a:round/>
-          </a:ln>
-          <a:effectLst>
-            <a:outerShdw blurRad="38100" dist="20000" dir="5400000" rotWithShape="0">
-              <a:srgbClr val="000000">
-                <a:alpha val="38000"/>
-              </a:srgbClr>
-            </a:outerShdw>
-          </a:effectLst>
-        </p:spPr>
-        <p:txBody>
-          <a:bodyPr lIns="0" tIns="0" rIns="0" bIns="0"/>
-          <a:lstStyle/>
-          <a:p>
-            <a:pPr lvl="0" defTabSz="457200">
-              <a:defRPr sz="1200">
-                <a:solidFill>
-                  <a:srgbClr val="000000"/>
-                </a:solidFill>
-                <a:uFillTx/>
-                <a:latin typeface="+mj-lt"/>
-                <a:ea typeface="+mj-ea"/>
-                <a:cs typeface="+mj-cs"/>
-                <a:sym typeface="Helvetica"/>
-              </a:defRPr>
-            </a:pPr>
-            <a:endParaRPr dirty="0">
-              <a:solidFill>
-                <a:schemeClr val="tx1"/>
-              </a:solidFill>
-              <a:latin typeface="Arial Unicode MS" panose="020B0604020202020204" pitchFamily="34" charset="-128"/>
-              <a:ea typeface="Arial Unicode MS" panose="020B0604020202020204" pitchFamily="34" charset="-128"/>
-              <a:cs typeface="Arial Unicode MS" panose="020B0604020202020204" pitchFamily="34" charset="-128"/>
-            </a:endParaRPr>
-          </a:p>
-        </p:txBody>
-      </p:sp>
-      <p:sp>
-        <p:nvSpPr>
-          <p:cNvPr id="432" name="Shape 432"/>
-          <p:cNvSpPr/>
-          <p:nvPr/>
-        </p:nvSpPr>
-        <p:spPr>
-          <a:xfrm flipV="1">
-            <a:off x="5780197" y="2569262"/>
-            <a:ext cx="170201" cy="170200"/>
-          </a:xfrm>
-          <a:prstGeom prst="line">
-            <a:avLst/>
-          </a:prstGeom>
-          <a:ln w="25400">
-            <a:solidFill>
-              <a:srgbClr val="011993"/>
-            </a:solidFill>
-            <a:round/>
-          </a:ln>
-          <a:effectLst>
-            <a:outerShdw blurRad="38100" dist="20000" dir="5400000" rotWithShape="0">
-              <a:srgbClr val="000000">
-                <a:alpha val="38000"/>
-              </a:srgbClr>
-            </a:outerShdw>
-          </a:effectLst>
-        </p:spPr>
-        <p:txBody>
-          <a:bodyPr lIns="0" tIns="0" rIns="0" bIns="0"/>
-          <a:lstStyle/>
-          <a:p>
-            <a:pPr lvl="0" defTabSz="457200">
-              <a:defRPr sz="1200">
-                <a:solidFill>
-                  <a:srgbClr val="000000"/>
-                </a:solidFill>
-                <a:uFillTx/>
-                <a:latin typeface="+mj-lt"/>
-                <a:ea typeface="+mj-ea"/>
-                <a:cs typeface="+mj-cs"/>
-                <a:sym typeface="Helvetica"/>
-              </a:defRPr>
-            </a:pPr>
-            <a:endParaRPr dirty="0">
-              <a:solidFill>
-                <a:schemeClr val="tx1"/>
-              </a:solidFill>
-              <a:latin typeface="Arial Unicode MS" panose="020B0604020202020204" pitchFamily="34" charset="-128"/>
-              <a:ea typeface="Arial Unicode MS" panose="020B0604020202020204" pitchFamily="34" charset="-128"/>
-              <a:cs typeface="Arial Unicode MS" panose="020B0604020202020204" pitchFamily="34" charset="-128"/>
-            </a:endParaRPr>
-          </a:p>
-        </p:txBody>
-      </p:sp>
-      <p:sp>
-        <p:nvSpPr>
-          <p:cNvPr id="433" name="Shape 433"/>
-          <p:cNvSpPr/>
-          <p:nvPr/>
-        </p:nvSpPr>
-        <p:spPr>
-          <a:xfrm flipH="1" flipV="1">
-            <a:off x="5785497" y="2735031"/>
-            <a:ext cx="177346" cy="177346"/>
-          </a:xfrm>
-          <a:prstGeom prst="line">
-            <a:avLst/>
-          </a:prstGeom>
-          <a:ln w="25400">
-            <a:solidFill>
-              <a:srgbClr val="011993"/>
-            </a:solidFill>
-            <a:round/>
-          </a:ln>
-          <a:effectLst>
-            <a:outerShdw blurRad="38100" dist="20000" dir="5400000" rotWithShape="0">
-              <a:srgbClr val="000000">
-                <a:alpha val="38000"/>
-              </a:srgbClr>
-            </a:outerShdw>
-          </a:effectLst>
-        </p:spPr>
-        <p:txBody>
-          <a:bodyPr lIns="0" tIns="0" rIns="0" bIns="0"/>
-          <a:lstStyle/>
-          <a:p>
-            <a:pPr lvl="0" defTabSz="457200">
-              <a:defRPr sz="1200">
-                <a:solidFill>
-                  <a:srgbClr val="000000"/>
-                </a:solidFill>
-                <a:uFillTx/>
-                <a:latin typeface="+mj-lt"/>
-                <a:ea typeface="+mj-ea"/>
-                <a:cs typeface="+mj-cs"/>
-                <a:sym typeface="Helvetica"/>
-              </a:defRPr>
-            </a:pPr>
-            <a:endParaRPr dirty="0">
-              <a:solidFill>
-                <a:schemeClr val="tx1"/>
-              </a:solidFill>
-              <a:latin typeface="Arial Unicode MS" panose="020B0604020202020204" pitchFamily="34" charset="-128"/>
-              <a:ea typeface="Arial Unicode MS" panose="020B0604020202020204" pitchFamily="34" charset="-128"/>
-              <a:cs typeface="Arial Unicode MS" panose="020B0604020202020204" pitchFamily="34" charset="-128"/>
-            </a:endParaRPr>
-          </a:p>
-        </p:txBody>
-      </p:sp>
-      <p:sp>
-        <p:nvSpPr>
-          <p:cNvPr id="12" name="Shape 428"/>
-          <p:cNvSpPr/>
-          <p:nvPr/>
-        </p:nvSpPr>
-        <p:spPr>
-          <a:xfrm>
-            <a:off x="5650149" y="6059402"/>
-            <a:ext cx="155851" cy="0"/>
-          </a:xfrm>
-          <a:prstGeom prst="line">
-            <a:avLst/>
-          </a:prstGeom>
-          <a:ln w="25400">
-            <a:solidFill>
-              <a:srgbClr val="011993"/>
-            </a:solidFill>
-            <a:round/>
-          </a:ln>
-          <a:effectLst>
-            <a:outerShdw blurRad="38100" dist="20000" dir="5400000" rotWithShape="0">
-              <a:srgbClr val="000000">
-                <a:alpha val="38000"/>
-              </a:srgbClr>
-            </a:outerShdw>
-          </a:effectLst>
-        </p:spPr>
-        <p:txBody>
-          <a:bodyPr lIns="0" tIns="0" rIns="0" bIns="0"/>
-          <a:lstStyle/>
-          <a:p>
-            <a:pPr lvl="0" defTabSz="457200">
-              <a:defRPr sz="1200">
-                <a:solidFill>
-                  <a:srgbClr val="000000"/>
-                </a:solidFill>
-                <a:uFillTx/>
-                <a:latin typeface="+mj-lt"/>
-                <a:ea typeface="+mj-ea"/>
-                <a:cs typeface="+mj-cs"/>
-                <a:sym typeface="Helvetica"/>
-              </a:defRPr>
-            </a:pPr>
-            <a:endParaRPr dirty="0">
-              <a:solidFill>
-                <a:schemeClr val="tx1"/>
-              </a:solidFill>
-              <a:latin typeface="Arial Unicode MS" panose="020B0604020202020204" pitchFamily="34" charset="-128"/>
-              <a:ea typeface="Arial Unicode MS" panose="020B0604020202020204" pitchFamily="34" charset="-128"/>
-              <a:cs typeface="Arial Unicode MS" panose="020B0604020202020204" pitchFamily="34" charset="-128"/>
-            </a:endParaRPr>
-          </a:p>
-        </p:txBody>
-      </p:sp>
-      <p:sp>
-        <p:nvSpPr>
-          <p:cNvPr id="13" name="Shape 430"/>
-          <p:cNvSpPr/>
-          <p:nvPr/>
-        </p:nvSpPr>
-        <p:spPr>
-          <a:xfrm flipV="1">
-            <a:off x="5727054" y="5940968"/>
-            <a:ext cx="2" cy="260545"/>
-          </a:xfrm>
-          <a:prstGeom prst="line">
-            <a:avLst/>
-          </a:prstGeom>
-          <a:ln w="25400">
-            <a:solidFill>
-              <a:srgbClr val="011993"/>
-            </a:solidFill>
-            <a:round/>
-          </a:ln>
-          <a:effectLst>
-            <a:outerShdw blurRad="38100" dist="20000" dir="5400000" rotWithShape="0">
-              <a:srgbClr val="000000">
-                <a:alpha val="38000"/>
-              </a:srgbClr>
-            </a:outerShdw>
-          </a:effectLst>
-        </p:spPr>
-        <p:txBody>
-          <a:bodyPr lIns="0" tIns="0" rIns="0" bIns="0"/>
-          <a:lstStyle/>
-          <a:p>
-            <a:pPr lvl="0" defTabSz="457200">
-              <a:defRPr sz="1200">
-                <a:solidFill>
-                  <a:srgbClr val="000000"/>
-                </a:solidFill>
-                <a:uFillTx/>
-                <a:latin typeface="+mj-lt"/>
-                <a:ea typeface="+mj-ea"/>
-                <a:cs typeface="+mj-cs"/>
-                <a:sym typeface="Helvetica"/>
-              </a:defRPr>
-            </a:pPr>
-            <a:endParaRPr dirty="0">
-              <a:solidFill>
-                <a:schemeClr val="tx1"/>
-              </a:solidFill>
-              <a:latin typeface="Arial Unicode MS" panose="020B0604020202020204" pitchFamily="34" charset="-128"/>
-              <a:ea typeface="Arial Unicode MS" panose="020B0604020202020204" pitchFamily="34" charset="-128"/>
-              <a:cs typeface="Arial Unicode MS" panose="020B0604020202020204" pitchFamily="34" charset="-128"/>
-            </a:endParaRPr>
-          </a:p>
-        </p:txBody>
-      </p:sp>
-    </p:spTree>
-  </p:cSld>
-  <p:clrMapOvr>
-    <a:masterClrMapping/>
-  </p:clrMapOvr>
-  <p:transition spd="med"/>
-</p:sld>
-</file>
-
-<file path=ppt/slides/slide18.xml><?xml version="1.0" encoding="utf-8"?>
-<p:sld xmlns:a="http://schemas.openxmlformats.org/drawingml/2006/main" xmlns:r="http://schemas.openxmlformats.org/officeDocument/2006/relationships" xmlns:p="http://schemas.openxmlformats.org/presentationml/2006/main">
-  <p:cSld>
-    <p:spTree>
-      <p:nvGrpSpPr>
-        <p:cNvPr id="1" name=""/>
-        <p:cNvGrpSpPr/>
-        <p:nvPr/>
-      </p:nvGrpSpPr>
-      <p:grpSpPr>
-        <a:xfrm>
-          <a:off x="0" y="0"/>
-          <a:ext cx="0" cy="0"/>
-          <a:chOff x="0" y="0"/>
-          <a:chExt cx="0" cy="0"/>
-        </a:xfrm>
-      </p:grpSpPr>
-      <p:sp>
-        <p:nvSpPr>
-          <p:cNvPr id="396" name="Shape 396"/>
-          <p:cNvSpPr/>
-          <p:nvPr/>
-        </p:nvSpPr>
-        <p:spPr>
-          <a:xfrm>
-            <a:off x="386308" y="147496"/>
-            <a:ext cx="7757379" cy="461665"/>
-          </a:xfrm>
-          <a:prstGeom prst="rect">
-            <a:avLst/>
-          </a:prstGeom>
-          <a:ln w="12700">
-            <a:miter lim="400000"/>
-          </a:ln>
-          <a:extLst>
-            <a:ext uri="{C572A759-6A51-4108-AA02-DFA0A04FC94B}">
-              <ma14:wrappingTextBoxFlag xmlns="" xmlns:ma14="http://schemas.microsoft.com/office/mac/drawingml/2011/main" val="1"/>
-            </a:ext>
-          </a:extLst>
-        </p:spPr>
-        <p:txBody>
-          <a:bodyPr lIns="0" tIns="0" rIns="0" bIns="0">
-            <a:spAutoFit/>
-          </a:bodyPr>
-          <a:lstStyle>
-            <a:lvl1pPr>
-              <a:defRPr sz="3000" b="1">
-                <a:uFill>
-                  <a:solidFill>
-                    <a:srgbClr val="FFFFFF"/>
-                  </a:solidFill>
-                </a:uFill>
-              </a:defRPr>
-            </a:lvl1pPr>
-          </a:lstStyle>
-          <a:p>
-            <a:pPr lvl="0">
-              <a:defRPr sz="1800" b="0">
-                <a:solidFill>
-                  <a:srgbClr val="000000"/>
-                </a:solidFill>
-                <a:uFillTx/>
-              </a:defRPr>
-            </a:pPr>
-            <a:r>
-              <a:rPr sz="3000" b="1" dirty="0">
-                <a:solidFill>
-                  <a:schemeClr val="tx1"/>
+              <a:rPr sz="3000" b="0" dirty="0">
+                <a:solidFill>
+                  <a:srgbClr val="57068C"/>
                 </a:solidFill>
                 <a:uFill>
                   <a:solidFill>
@@ -14801,7 +13509,7 @@
 </p:sld>
 </file>
 
-<file path=ppt/slides/slide19.xml><?xml version="1.0" encoding="utf-8"?>
+<file path=ppt/slides/slide17.xml><?xml version="1.0" encoding="utf-8"?>
 <p:sld xmlns:a="http://schemas.openxmlformats.org/drawingml/2006/main" xmlns:r="http://schemas.openxmlformats.org/officeDocument/2006/relationships" xmlns:p="http://schemas.openxmlformats.org/presentationml/2006/main">
   <p:cSld>
     <p:spTree>
@@ -14820,7 +13528,7 @@
       </p:grpSpPr>
       <p:sp>
         <p:nvSpPr>
-          <p:cNvPr id="436" name="Shape 436"/>
+          <p:cNvPr id="417" name="Shape 417"/>
           <p:cNvSpPr/>
           <p:nvPr/>
         </p:nvSpPr>
@@ -14866,9 +13574,1422 @@
               </a:defRPr>
             </a:pPr>
             <a:r>
-              <a:rPr sz="3000" b="1" dirty="0">
+              <a:rPr lang="en-US" sz="3000" b="0" dirty="0">
+                <a:solidFill>
+                  <a:srgbClr val="57068C"/>
+                </a:solidFill>
+                <a:uFill>
+                  <a:solidFill>
+                    <a:srgbClr val="FFFFFF"/>
+                  </a:solidFill>
+                </a:uFill>
+                <a:latin typeface="Arial Unicode MS" panose="020B0604020202020204" pitchFamily="34" charset="-128"/>
+                <a:ea typeface="Arial Unicode MS" panose="020B0604020202020204" pitchFamily="34" charset="-128"/>
+                <a:cs typeface="Arial Unicode MS" panose="020B0604020202020204" pitchFamily="34" charset="-128"/>
+              </a:rPr>
+              <a:t>Cardinality</a:t>
+            </a:r>
+            <a:r>
+              <a:rPr sz="3000" b="0" dirty="0">
+                <a:solidFill>
+                  <a:srgbClr val="57068C"/>
+                </a:solidFill>
+                <a:uFill>
+                  <a:solidFill>
+                    <a:srgbClr val="FFFFFF"/>
+                  </a:solidFill>
+                </a:uFill>
+                <a:latin typeface="Arial Unicode MS" panose="020B0604020202020204" pitchFamily="34" charset="-128"/>
+                <a:ea typeface="Arial Unicode MS" panose="020B0604020202020204" pitchFamily="34" charset="-128"/>
+                <a:cs typeface="Arial Unicode MS" panose="020B0604020202020204" pitchFamily="34" charset="-128"/>
+              </a:rPr>
+              <a:t> Notation Example</a:t>
+            </a:r>
+          </a:p>
+        </p:txBody>
+      </p:sp>
+      <p:grpSp>
+        <p:nvGrpSpPr>
+          <p:cNvPr id="420" name="Group 420"/>
+          <p:cNvGrpSpPr/>
+          <p:nvPr/>
+        </p:nvGrpSpPr>
+        <p:grpSpPr>
+          <a:xfrm>
+            <a:off x="810986" y="881743"/>
+            <a:ext cx="7467600" cy="3411539"/>
+            <a:chOff x="0" y="0"/>
+            <a:chExt cx="7467600" cy="3411538"/>
+          </a:xfrm>
+        </p:grpSpPr>
+        <p:sp>
+          <p:nvSpPr>
+            <p:cNvPr id="418" name="Shape 418"/>
+            <p:cNvSpPr/>
+            <p:nvPr/>
+          </p:nvSpPr>
+          <p:spPr>
+            <a:xfrm>
+              <a:off x="0" y="0"/>
+              <a:ext cx="7467600" cy="3411538"/>
+            </a:xfrm>
+            <a:prstGeom prst="rect">
+              <a:avLst/>
+            </a:prstGeom>
+            <a:solidFill>
+              <a:srgbClr val="FFFFFF"/>
+            </a:solidFill>
+            <a:ln w="12700" cap="flat">
+              <a:noFill/>
+              <a:miter lim="400000"/>
+            </a:ln>
+            <a:effectLst/>
+          </p:spPr>
+          <p:txBody>
+            <a:bodyPr wrap="square" lIns="0" tIns="0" rIns="0" bIns="0" numCol="1" anchor="t">
+              <a:noAutofit/>
+            </a:bodyPr>
+            <a:lstStyle/>
+            <a:p>
+              <a:pPr lvl="0">
+                <a:defRPr sz="1800">
+                  <a:solidFill>
+                    <a:srgbClr val="000000"/>
+                  </a:solidFill>
+                  <a:latin typeface="+mn-lt"/>
+                  <a:ea typeface="+mn-ea"/>
+                  <a:cs typeface="+mn-cs"/>
+                  <a:sym typeface="Arial"/>
+                </a:defRPr>
+              </a:pPr>
+              <a:endParaRPr dirty="0">
                 <a:solidFill>
                   <a:schemeClr val="tx1"/>
+                </a:solidFill>
+                <a:latin typeface="Arial Unicode MS" panose="020B0604020202020204" pitchFamily="34" charset="-128"/>
+                <a:ea typeface="Arial Unicode MS" panose="020B0604020202020204" pitchFamily="34" charset="-128"/>
+                <a:cs typeface="Arial Unicode MS" panose="020B0604020202020204" pitchFamily="34" charset="-128"/>
+              </a:endParaRPr>
+            </a:p>
+          </p:txBody>
+        </p:sp>
+        <p:pic>
+          <p:nvPicPr>
+            <p:cNvPr id="419" name="image.pdf"/>
+            <p:cNvPicPr/>
+            <p:nvPr/>
+          </p:nvPicPr>
+          <p:blipFill>
+            <a:blip r:embed="rId3">
+              <a:extLst/>
+            </a:blip>
+            <a:stretch>
+              <a:fillRect/>
+            </a:stretch>
+          </p:blipFill>
+          <p:spPr>
+            <a:xfrm>
+              <a:off x="0" y="0"/>
+              <a:ext cx="7467600" cy="3411538"/>
+            </a:xfrm>
+            <a:prstGeom prst="rect">
+              <a:avLst/>
+            </a:prstGeom>
+            <a:ln w="12700" cap="flat">
+              <a:noFill/>
+              <a:miter lim="400000"/>
+            </a:ln>
+            <a:effectLst/>
+          </p:spPr>
+        </p:pic>
+      </p:grpSp>
+      <p:sp>
+        <p:nvSpPr>
+          <p:cNvPr id="2" name="TextBox 1"/>
+          <p:cNvSpPr txBox="1"/>
+          <p:nvPr/>
+        </p:nvSpPr>
+        <p:spPr>
+          <a:xfrm>
+            <a:off x="92529" y="5176158"/>
+            <a:ext cx="8904514" cy="1631216"/>
+          </a:xfrm>
+          <a:prstGeom prst="rect">
+            <a:avLst/>
+          </a:prstGeom>
+          <a:noFill/>
+        </p:spPr>
+        <p:txBody>
+          <a:bodyPr wrap="square" rtlCol="0">
+            <a:spAutoFit/>
+          </a:bodyPr>
+          <a:lstStyle/>
+          <a:p>
+            <a:r>
+              <a:rPr lang="en-US" dirty="0">
+                <a:solidFill>
+                  <a:schemeClr val="tx1"/>
+                </a:solidFill>
+                <a:latin typeface="Arial Unicode MS" panose="020B0604020202020204" pitchFamily="34" charset="-128"/>
+                <a:ea typeface="Arial Unicode MS" panose="020B0604020202020204" pitchFamily="34" charset="-128"/>
+                <a:cs typeface="Arial Unicode MS" panose="020B0604020202020204" pitchFamily="34" charset="-128"/>
+              </a:rPr>
+              <a:t>Notice that </a:t>
+            </a:r>
+          </a:p>
+          <a:p>
+            <a:pPr marL="342900" indent="-342900">
+              <a:buFont typeface="Arial" panose="020B0604020202020204" pitchFamily="34" charset="0"/>
+              <a:buChar char="•"/>
+            </a:pPr>
+            <a:r>
+              <a:rPr lang="en-US" dirty="0">
+                <a:solidFill>
+                  <a:schemeClr val="tx1"/>
+                </a:solidFill>
+                <a:latin typeface="Arial Unicode MS" panose="020B0604020202020204" pitchFamily="34" charset="-128"/>
+                <a:ea typeface="Arial Unicode MS" panose="020B0604020202020204" pitchFamily="34" charset="-128"/>
+                <a:cs typeface="Arial Unicode MS" panose="020B0604020202020204" pitchFamily="34" charset="-128"/>
+              </a:rPr>
+              <a:t>The “1-1” cardinality next to the Course means that “Each Offering has at least one and at most one Course”</a:t>
+            </a:r>
+          </a:p>
+          <a:p>
+            <a:pPr marL="342900" indent="-342900">
+              <a:buFont typeface="Arial" panose="020B0604020202020204" pitchFamily="34" charset="0"/>
+              <a:buChar char="•"/>
+            </a:pPr>
+            <a:r>
+              <a:rPr lang="en-US" dirty="0">
+                <a:solidFill>
+                  <a:schemeClr val="tx1"/>
+                </a:solidFill>
+                <a:latin typeface="Arial Unicode MS" panose="020B0604020202020204" pitchFamily="34" charset="-128"/>
+                <a:ea typeface="Arial Unicode MS" panose="020B0604020202020204" pitchFamily="34" charset="-128"/>
+                <a:cs typeface="Arial Unicode MS" panose="020B0604020202020204" pitchFamily="34" charset="-128"/>
+              </a:rPr>
+              <a:t>The “0-many” cardinality next to the Offering means that “Each Course may have zero offerings and may have many offerings”</a:t>
+            </a:r>
+          </a:p>
+        </p:txBody>
+      </p:sp>
+    </p:spTree>
+  </p:cSld>
+  <p:clrMapOvr>
+    <a:masterClrMapping/>
+  </p:clrMapOvr>
+  <p:transition spd="med"/>
+</p:sld>
+</file>
+
+<file path=ppt/slides/slide18.xml><?xml version="1.0" encoding="utf-8"?>
+<p:sld xmlns:a="http://schemas.openxmlformats.org/drawingml/2006/main" xmlns:r="http://schemas.openxmlformats.org/officeDocument/2006/relationships" xmlns:p="http://schemas.openxmlformats.org/presentationml/2006/main">
+  <p:cSld>
+    <p:spTree>
+      <p:nvGrpSpPr>
+        <p:cNvPr id="1" name=""/>
+        <p:cNvGrpSpPr/>
+        <p:nvPr/>
+      </p:nvGrpSpPr>
+      <p:grpSpPr>
+        <a:xfrm>
+          <a:off x="0" y="0"/>
+          <a:ext cx="0" cy="0"/>
+          <a:chOff x="0" y="0"/>
+          <a:chExt cx="0" cy="0"/>
+        </a:xfrm>
+      </p:grpSpPr>
+      <p:sp>
+        <p:nvSpPr>
+          <p:cNvPr id="425" name="Shape 425"/>
+          <p:cNvSpPr/>
+          <p:nvPr/>
+        </p:nvSpPr>
+        <p:spPr>
+          <a:xfrm>
+            <a:off x="386308" y="147496"/>
+            <a:ext cx="7757379" cy="461665"/>
+          </a:xfrm>
+          <a:prstGeom prst="rect">
+            <a:avLst/>
+          </a:prstGeom>
+          <a:ln w="12700">
+            <a:miter lim="400000"/>
+          </a:ln>
+          <a:extLst>
+            <a:ext uri="{C572A759-6A51-4108-AA02-DFA0A04FC94B}">
+              <ma14:wrappingTextBoxFlag xmlns="" xmlns:ma14="http://schemas.microsoft.com/office/mac/drawingml/2011/main" val="1"/>
+            </a:ext>
+          </a:extLst>
+        </p:spPr>
+        <p:txBody>
+          <a:bodyPr lIns="0" tIns="0" rIns="0" bIns="0">
+            <a:spAutoFit/>
+          </a:bodyPr>
+          <a:lstStyle>
+            <a:lvl1pPr>
+              <a:defRPr sz="3000" b="1">
+                <a:uFill>
+                  <a:solidFill>
+                    <a:srgbClr val="FFFFFF"/>
+                  </a:solidFill>
+                </a:uFill>
+              </a:defRPr>
+            </a:lvl1pPr>
+          </a:lstStyle>
+          <a:p>
+            <a:pPr lvl="0">
+              <a:defRPr sz="1800" b="0">
+                <a:solidFill>
+                  <a:srgbClr val="000000"/>
+                </a:solidFill>
+                <a:uFillTx/>
+              </a:defRPr>
+            </a:pPr>
+            <a:r>
+              <a:rPr sz="3000" b="0" dirty="0">
+                <a:solidFill>
+                  <a:srgbClr val="57068C"/>
+                </a:solidFill>
+                <a:uFill>
+                  <a:solidFill>
+                    <a:srgbClr val="FFFFFF"/>
+                  </a:solidFill>
+                </a:uFill>
+                <a:latin typeface="Arial Unicode MS" panose="020B0604020202020204" pitchFamily="34" charset="-128"/>
+                <a:ea typeface="Arial Unicode MS" panose="020B0604020202020204" pitchFamily="34" charset="-128"/>
+                <a:cs typeface="Arial Unicode MS" panose="020B0604020202020204" pitchFamily="34" charset="-128"/>
+              </a:rPr>
+              <a:t>Examples of Cardinality Signs</a:t>
+            </a:r>
+          </a:p>
+        </p:txBody>
+      </p:sp>
+      <p:sp>
+        <p:nvSpPr>
+          <p:cNvPr id="426" name="Shape 426"/>
+          <p:cNvSpPr/>
+          <p:nvPr/>
+        </p:nvSpPr>
+        <p:spPr>
+          <a:xfrm>
+            <a:off x="461021" y="839198"/>
+            <a:ext cx="7590195" cy="5870838"/>
+          </a:xfrm>
+          <a:prstGeom prst="rect">
+            <a:avLst/>
+          </a:prstGeom>
+          <a:ln w="12700">
+            <a:miter lim="400000"/>
+          </a:ln>
+          <a:extLst>
+            <a:ext uri="{C572A759-6A51-4108-AA02-DFA0A04FC94B}">
+              <ma14:wrappingTextBoxFlag xmlns="" xmlns:ma14="http://schemas.microsoft.com/office/mac/drawingml/2011/main" val="1"/>
+            </a:ext>
+          </a:extLst>
+        </p:spPr>
+        <p:txBody>
+          <a:bodyPr lIns="0" tIns="0" rIns="0" bIns="0">
+            <a:spAutoFit/>
+          </a:bodyPr>
+          <a:lstStyle/>
+          <a:p>
+            <a:pPr marL="342900" lvl="0" indent="-304800" algn="just">
+              <a:spcBef>
+                <a:spcPts val="700"/>
+              </a:spcBef>
+              <a:buSzPct val="50000"/>
+              <a:buBlip>
+                <a:blip r:embed="rId3"/>
+              </a:buBlip>
+              <a:defRPr sz="1800">
+                <a:solidFill>
+                  <a:srgbClr val="000000"/>
+                </a:solidFill>
+                <a:uFillTx/>
+              </a:defRPr>
+            </a:pPr>
+            <a:r>
+              <a:rPr lang="en-US" sz="2600" u="sng" dirty="0">
+                <a:solidFill>
+                  <a:schemeClr val="tx1"/>
+                </a:solidFill>
+                <a:uFill>
+                  <a:solidFill/>
+                </a:uFill>
+                <a:latin typeface="Arial Unicode MS" panose="020B0604020202020204" pitchFamily="34" charset="-128"/>
+                <a:ea typeface="Arial Unicode MS" panose="020B0604020202020204" pitchFamily="34" charset="-128"/>
+                <a:cs typeface="Arial Unicode MS" panose="020B0604020202020204" pitchFamily="34" charset="-128"/>
+                <a:sym typeface="Iowan Old Style Roman"/>
+              </a:rPr>
+              <a:t>Minimum</a:t>
+            </a:r>
+            <a:r>
+              <a:rPr sz="2600" u="sng" dirty="0">
+                <a:solidFill>
+                  <a:schemeClr val="tx1"/>
+                </a:solidFill>
+                <a:uFill>
+                  <a:solidFill/>
+                </a:uFill>
+                <a:latin typeface="Arial Unicode MS" panose="020B0604020202020204" pitchFamily="34" charset="-128"/>
+                <a:ea typeface="Arial Unicode MS" panose="020B0604020202020204" pitchFamily="34" charset="-128"/>
+                <a:cs typeface="Arial Unicode MS" panose="020B0604020202020204" pitchFamily="34" charset="-128"/>
+                <a:sym typeface="Iowan Old Style Roman"/>
+              </a:rPr>
+              <a:t>-one</a:t>
+            </a:r>
+            <a:r>
+              <a:rPr lang="en-US" sz="2600" u="sng" dirty="0">
+                <a:solidFill>
+                  <a:schemeClr val="tx1"/>
+                </a:solidFill>
+                <a:uFill>
+                  <a:solidFill/>
+                </a:uFill>
+                <a:latin typeface="Arial Unicode MS" panose="020B0604020202020204" pitchFamily="34" charset="-128"/>
+                <a:ea typeface="Arial Unicode MS" panose="020B0604020202020204" pitchFamily="34" charset="-128"/>
+                <a:cs typeface="Arial Unicode MS" panose="020B0604020202020204" pitchFamily="34" charset="-128"/>
+                <a:sym typeface="Iowan Old Style Roman"/>
+              </a:rPr>
+              <a:t>, Maximum-one</a:t>
+            </a:r>
+            <a:r>
+              <a:rPr sz="2600" dirty="0">
+                <a:solidFill>
+                  <a:schemeClr val="tx1"/>
+                </a:solidFill>
+                <a:uFill>
+                  <a:solidFill/>
+                </a:uFill>
+                <a:latin typeface="Arial Unicode MS" panose="020B0604020202020204" pitchFamily="34" charset="-128"/>
+                <a:ea typeface="Arial Unicode MS" panose="020B0604020202020204" pitchFamily="34" charset="-128"/>
+                <a:cs typeface="Arial Unicode MS" panose="020B0604020202020204" pitchFamily="34" charset="-128"/>
+                <a:sym typeface="Iowan Old Style Roman"/>
+              </a:rPr>
+              <a:t> ( || )</a:t>
+            </a:r>
+            <a:r>
+              <a:rPr lang="en-US" sz="2600" dirty="0">
+                <a:solidFill>
+                  <a:schemeClr val="tx1"/>
+                </a:solidFill>
+                <a:uFill>
+                  <a:solidFill/>
+                </a:uFill>
+                <a:latin typeface="Arial Unicode MS" panose="020B0604020202020204" pitchFamily="34" charset="-128"/>
+                <a:ea typeface="Arial Unicode MS" panose="020B0604020202020204" pitchFamily="34" charset="-128"/>
+                <a:cs typeface="Arial Unicode MS" panose="020B0604020202020204" pitchFamily="34" charset="-128"/>
+                <a:sym typeface="Iowan Old Style Roman"/>
+              </a:rPr>
+              <a:t>:</a:t>
+            </a:r>
+            <a:r>
+              <a:rPr sz="2600" dirty="0">
+                <a:solidFill>
+                  <a:schemeClr val="tx1"/>
+                </a:solidFill>
+                <a:uFill>
+                  <a:solidFill/>
+                </a:uFill>
+                <a:latin typeface="Arial Unicode MS" panose="020B0604020202020204" pitchFamily="34" charset="-128"/>
+                <a:ea typeface="Arial Unicode MS" panose="020B0604020202020204" pitchFamily="34" charset="-128"/>
+                <a:cs typeface="Arial Unicode MS" panose="020B0604020202020204" pitchFamily="34" charset="-128"/>
+                <a:sym typeface="Iowan Old Style Roman"/>
+              </a:rPr>
+              <a:t> there must be exactly 1 relationship.  e.g., a professor must have </a:t>
+            </a:r>
+            <a:r>
+              <a:rPr lang="en-US" sz="2600" dirty="0">
+                <a:solidFill>
+                  <a:schemeClr val="tx1"/>
+                </a:solidFill>
+                <a:uFill>
+                  <a:solidFill/>
+                </a:uFill>
+                <a:latin typeface="Arial Unicode MS" panose="020B0604020202020204" pitchFamily="34" charset="-128"/>
+                <a:ea typeface="Arial Unicode MS" panose="020B0604020202020204" pitchFamily="34" charset="-128"/>
+                <a:cs typeface="Arial Unicode MS" panose="020B0604020202020204" pitchFamily="34" charset="-128"/>
+                <a:sym typeface="Iowan Old Style Roman"/>
+              </a:rPr>
+              <a:t>an office (minimum one) and </a:t>
+            </a:r>
+            <a:r>
+              <a:rPr sz="2600" dirty="0">
+                <a:solidFill>
+                  <a:schemeClr val="tx1"/>
+                </a:solidFill>
+                <a:uFill>
+                  <a:solidFill/>
+                </a:uFill>
+                <a:latin typeface="Arial Unicode MS" panose="020B0604020202020204" pitchFamily="34" charset="-128"/>
+                <a:ea typeface="Arial Unicode MS" panose="020B0604020202020204" pitchFamily="34" charset="-128"/>
+                <a:cs typeface="Arial Unicode MS" panose="020B0604020202020204" pitchFamily="34" charset="-128"/>
+                <a:sym typeface="Iowan Old Style Roman"/>
+              </a:rPr>
+              <a:t>exactly </a:t>
+            </a:r>
+            <a:r>
+              <a:rPr lang="en-US" sz="2600" dirty="0">
+                <a:solidFill>
+                  <a:schemeClr val="tx1"/>
+                </a:solidFill>
+                <a:uFillTx/>
+                <a:latin typeface="Arial Unicode MS" panose="020B0604020202020204" pitchFamily="34" charset="-128"/>
+                <a:ea typeface="Arial Unicode MS" panose="020B0604020202020204" pitchFamily="34" charset="-128"/>
+                <a:cs typeface="Arial Unicode MS" panose="020B0604020202020204" pitchFamily="34" charset="-128"/>
+                <a:sym typeface="Iowan Old Style Roman"/>
+              </a:rPr>
+              <a:t>one</a:t>
+            </a:r>
+            <a:r>
+              <a:rPr sz="2600" dirty="0">
+                <a:solidFill>
+                  <a:schemeClr val="tx1"/>
+                </a:solidFill>
+                <a:uFill>
+                  <a:solidFill/>
+                </a:uFill>
+                <a:latin typeface="Arial Unicode MS" panose="020B0604020202020204" pitchFamily="34" charset="-128"/>
+                <a:ea typeface="Arial Unicode MS" panose="020B0604020202020204" pitchFamily="34" charset="-128"/>
+                <a:cs typeface="Arial Unicode MS" panose="020B0604020202020204" pitchFamily="34" charset="-128"/>
+                <a:sym typeface="Iowan Old Style Roman"/>
+              </a:rPr>
+              <a:t> office</a:t>
+            </a:r>
+            <a:r>
+              <a:rPr lang="en-US" sz="2600" dirty="0">
+                <a:solidFill>
+                  <a:schemeClr val="tx1"/>
+                </a:solidFill>
+                <a:uFill>
+                  <a:solidFill/>
+                </a:uFill>
+                <a:latin typeface="Arial Unicode MS" panose="020B0604020202020204" pitchFamily="34" charset="-128"/>
+                <a:ea typeface="Arial Unicode MS" panose="020B0604020202020204" pitchFamily="34" charset="-128"/>
+                <a:cs typeface="Arial Unicode MS" panose="020B0604020202020204" pitchFamily="34" charset="-128"/>
+                <a:sym typeface="Iowan Old Style Roman"/>
+              </a:rPr>
+              <a:t> (maximum one)</a:t>
+            </a:r>
+            <a:r>
+              <a:rPr sz="2600" dirty="0">
+                <a:solidFill>
+                  <a:schemeClr val="tx1"/>
+                </a:solidFill>
+                <a:uFill>
+                  <a:solidFill/>
+                </a:uFill>
+                <a:latin typeface="Arial Unicode MS" panose="020B0604020202020204" pitchFamily="34" charset="-128"/>
+                <a:ea typeface="Arial Unicode MS" panose="020B0604020202020204" pitchFamily="34" charset="-128"/>
+                <a:cs typeface="Arial Unicode MS" panose="020B0604020202020204" pitchFamily="34" charset="-128"/>
+                <a:sym typeface="Iowan Old Style Roman"/>
+              </a:rPr>
+              <a:t>.</a:t>
+            </a:r>
+          </a:p>
+          <a:p>
+            <a:pPr marL="342900" lvl="0" indent="-304800" algn="just">
+              <a:spcBef>
+                <a:spcPts val="700"/>
+              </a:spcBef>
+              <a:buSzPct val="50000"/>
+              <a:buBlip>
+                <a:blip r:embed="rId3"/>
+              </a:buBlip>
+              <a:defRPr sz="1800">
+                <a:solidFill>
+                  <a:srgbClr val="000000"/>
+                </a:solidFill>
+                <a:uFillTx/>
+              </a:defRPr>
+            </a:pPr>
+            <a:r>
+              <a:rPr lang="en-US" sz="2600" u="sng" dirty="0">
+                <a:solidFill>
+                  <a:schemeClr val="tx1"/>
+                </a:solidFill>
+                <a:latin typeface="Arial Unicode MS" panose="020B0604020202020204" pitchFamily="34" charset="-128"/>
+                <a:ea typeface="Arial Unicode MS" panose="020B0604020202020204" pitchFamily="34" charset="-128"/>
+                <a:cs typeface="Arial Unicode MS" panose="020B0604020202020204" pitchFamily="34" charset="-128"/>
+                <a:sym typeface="Iowan Old Style Roman"/>
+              </a:rPr>
+              <a:t>Minimum-o</a:t>
+            </a:r>
+            <a:r>
+              <a:rPr sz="2600" u="sng" dirty="0">
+                <a:solidFill>
+                  <a:schemeClr val="tx1"/>
+                </a:solidFill>
+                <a:uFill>
+                  <a:solidFill/>
+                </a:uFill>
+                <a:latin typeface="Arial Unicode MS" panose="020B0604020202020204" pitchFamily="34" charset="-128"/>
+                <a:ea typeface="Arial Unicode MS" panose="020B0604020202020204" pitchFamily="34" charset="-128"/>
+                <a:cs typeface="Arial Unicode MS" panose="020B0604020202020204" pitchFamily="34" charset="-128"/>
+                <a:sym typeface="Iowan Old Style Roman"/>
+              </a:rPr>
+              <a:t>ne</a:t>
+            </a:r>
+            <a:r>
+              <a:rPr lang="en-US" sz="2600" u="sng" dirty="0">
+                <a:solidFill>
+                  <a:schemeClr val="tx1"/>
+                </a:solidFill>
+                <a:uFill>
+                  <a:solidFill/>
+                </a:uFill>
+                <a:latin typeface="Arial Unicode MS" panose="020B0604020202020204" pitchFamily="34" charset="-128"/>
+                <a:ea typeface="Arial Unicode MS" panose="020B0604020202020204" pitchFamily="34" charset="-128"/>
+                <a:cs typeface="Arial Unicode MS" panose="020B0604020202020204" pitchFamily="34" charset="-128"/>
+                <a:sym typeface="Iowan Old Style Roman"/>
+              </a:rPr>
+              <a:t>, Maximum</a:t>
+            </a:r>
+            <a:r>
+              <a:rPr sz="2600" u="sng" dirty="0">
+                <a:solidFill>
+                  <a:schemeClr val="tx1"/>
+                </a:solidFill>
+                <a:uFill>
+                  <a:solidFill/>
+                </a:uFill>
+                <a:latin typeface="Arial Unicode MS" panose="020B0604020202020204" pitchFamily="34" charset="-128"/>
+                <a:ea typeface="Arial Unicode MS" panose="020B0604020202020204" pitchFamily="34" charset="-128"/>
+                <a:cs typeface="Arial Unicode MS" panose="020B0604020202020204" pitchFamily="34" charset="-128"/>
+                <a:sym typeface="Iowan Old Style Roman"/>
+              </a:rPr>
+              <a:t>-many</a:t>
+            </a:r>
+            <a:r>
+              <a:rPr sz="2600" dirty="0">
+                <a:solidFill>
+                  <a:schemeClr val="tx1"/>
+                </a:solidFill>
+                <a:uFill>
+                  <a:solidFill/>
+                </a:uFill>
+                <a:latin typeface="Arial Unicode MS" panose="020B0604020202020204" pitchFamily="34" charset="-128"/>
+                <a:ea typeface="Arial Unicode MS" panose="020B0604020202020204" pitchFamily="34" charset="-128"/>
+                <a:cs typeface="Arial Unicode MS" panose="020B0604020202020204" pitchFamily="34" charset="-128"/>
+                <a:sym typeface="Iowan Old Style Roman"/>
+              </a:rPr>
+              <a:t> ( |   ). e.g., each department </a:t>
+            </a:r>
+            <a:r>
+              <a:rPr lang="en-US" sz="2600" dirty="0">
+                <a:solidFill>
+                  <a:schemeClr val="tx1"/>
+                </a:solidFill>
+                <a:uFill>
+                  <a:solidFill/>
+                </a:uFill>
+                <a:latin typeface="Arial Unicode MS" panose="020B0604020202020204" pitchFamily="34" charset="-128"/>
+                <a:ea typeface="Arial Unicode MS" panose="020B0604020202020204" pitchFamily="34" charset="-128"/>
+                <a:cs typeface="Arial Unicode MS" panose="020B0604020202020204" pitchFamily="34" charset="-128"/>
+                <a:sym typeface="Iowan Old Style Roman"/>
+              </a:rPr>
+              <a:t>must have at least one instructor (minimum-one) but may also have</a:t>
+            </a:r>
+            <a:r>
+              <a:rPr sz="2600" dirty="0">
+                <a:solidFill>
+                  <a:schemeClr val="tx1"/>
+                </a:solidFill>
+                <a:uFill>
+                  <a:solidFill/>
+                </a:uFill>
+                <a:latin typeface="Arial Unicode MS" panose="020B0604020202020204" pitchFamily="34" charset="-128"/>
+                <a:ea typeface="Arial Unicode MS" panose="020B0604020202020204" pitchFamily="34" charset="-128"/>
+                <a:cs typeface="Arial Unicode MS" panose="020B0604020202020204" pitchFamily="34" charset="-128"/>
+                <a:sym typeface="Iowan Old Style Roman"/>
+              </a:rPr>
+              <a:t> many instructors (but at least one!)</a:t>
+            </a:r>
+          </a:p>
+          <a:p>
+            <a:pPr marL="342900" lvl="0" indent="-304800" algn="just">
+              <a:spcBef>
+                <a:spcPts val="700"/>
+              </a:spcBef>
+              <a:buSzPct val="50000"/>
+              <a:buBlip>
+                <a:blip r:embed="rId3"/>
+              </a:buBlip>
+              <a:defRPr sz="1800">
+                <a:solidFill>
+                  <a:srgbClr val="000000"/>
+                </a:solidFill>
+                <a:uFillTx/>
+              </a:defRPr>
+            </a:pPr>
+            <a:r>
+              <a:rPr lang="en-US" sz="2600" u="sng" dirty="0">
+                <a:solidFill>
+                  <a:schemeClr val="tx1"/>
+                </a:solidFill>
+                <a:uFill>
+                  <a:solidFill/>
+                </a:uFill>
+                <a:latin typeface="Arial Unicode MS" panose="020B0604020202020204" pitchFamily="34" charset="-128"/>
+                <a:ea typeface="Arial Unicode MS" panose="020B0604020202020204" pitchFamily="34" charset="-128"/>
+                <a:cs typeface="Arial Unicode MS" panose="020B0604020202020204" pitchFamily="34" charset="-128"/>
+                <a:sym typeface="Iowan Old Style Roman"/>
+              </a:rPr>
+              <a:t>Minimum-z</a:t>
+            </a:r>
+            <a:r>
+              <a:rPr sz="2600" u="sng" dirty="0">
+                <a:solidFill>
+                  <a:schemeClr val="tx1"/>
+                </a:solidFill>
+                <a:uFill>
+                  <a:solidFill/>
+                </a:uFill>
+                <a:latin typeface="Arial Unicode MS" panose="020B0604020202020204" pitchFamily="34" charset="-128"/>
+                <a:ea typeface="Arial Unicode MS" panose="020B0604020202020204" pitchFamily="34" charset="-128"/>
+                <a:cs typeface="Arial Unicode MS" panose="020B0604020202020204" pitchFamily="34" charset="-128"/>
+                <a:sym typeface="Iowan Old Style Roman"/>
+              </a:rPr>
+              <a:t>ero</a:t>
+            </a:r>
+            <a:r>
+              <a:rPr lang="en-US" sz="2600" u="sng" dirty="0">
+                <a:solidFill>
+                  <a:schemeClr val="tx1"/>
+                </a:solidFill>
+                <a:uFill>
+                  <a:solidFill/>
+                </a:uFill>
+                <a:latin typeface="Arial Unicode MS" panose="020B0604020202020204" pitchFamily="34" charset="-128"/>
+                <a:ea typeface="Arial Unicode MS" panose="020B0604020202020204" pitchFamily="34" charset="-128"/>
+                <a:cs typeface="Arial Unicode MS" panose="020B0604020202020204" pitchFamily="34" charset="-128"/>
+                <a:sym typeface="Iowan Old Style Roman"/>
+              </a:rPr>
+              <a:t>, Maximum-</a:t>
+            </a:r>
+            <a:r>
+              <a:rPr sz="2600" u="sng" dirty="0">
+                <a:solidFill>
+                  <a:schemeClr val="tx1"/>
+                </a:solidFill>
+                <a:uFill>
+                  <a:solidFill/>
+                </a:uFill>
+                <a:latin typeface="Arial Unicode MS" panose="020B0604020202020204" pitchFamily="34" charset="-128"/>
+                <a:ea typeface="Arial Unicode MS" panose="020B0604020202020204" pitchFamily="34" charset="-128"/>
+                <a:cs typeface="Arial Unicode MS" panose="020B0604020202020204" pitchFamily="34" charset="-128"/>
+                <a:sym typeface="Iowan Old Style Roman"/>
+              </a:rPr>
+              <a:t>many</a:t>
+            </a:r>
+            <a:r>
+              <a:rPr sz="2600" dirty="0">
+                <a:solidFill>
+                  <a:schemeClr val="tx1"/>
+                </a:solidFill>
+                <a:uFill>
+                  <a:solidFill/>
+                </a:uFill>
+                <a:latin typeface="Arial Unicode MS" panose="020B0604020202020204" pitchFamily="34" charset="-128"/>
+                <a:ea typeface="Arial Unicode MS" panose="020B0604020202020204" pitchFamily="34" charset="-128"/>
+                <a:cs typeface="Arial Unicode MS" panose="020B0604020202020204" pitchFamily="34" charset="-128"/>
+                <a:sym typeface="Iowan Old Style Roman"/>
+              </a:rPr>
+              <a:t> (   ). e.g., each </a:t>
+            </a:r>
+            <a:r>
+              <a:rPr lang="en-US" sz="2600" dirty="0">
+                <a:solidFill>
+                  <a:schemeClr val="tx1"/>
+                </a:solidFill>
+                <a:uFill>
+                  <a:solidFill/>
+                </a:uFill>
+                <a:latin typeface="Arial Unicode MS" panose="020B0604020202020204" pitchFamily="34" charset="-128"/>
+                <a:ea typeface="Arial Unicode MS" panose="020B0604020202020204" pitchFamily="34" charset="-128"/>
+                <a:cs typeface="Arial Unicode MS" panose="020B0604020202020204" pitchFamily="34" charset="-128"/>
+                <a:sym typeface="Iowan Old Style Roman"/>
+              </a:rPr>
+              <a:t>person can have a maximum of many phones (maximum-many) but may also have no phone number (minimum-zero)</a:t>
+            </a:r>
+          </a:p>
+          <a:p>
+            <a:pPr marL="342900" lvl="0" indent="-304800" algn="just">
+              <a:spcBef>
+                <a:spcPts val="700"/>
+              </a:spcBef>
+              <a:buSzPct val="50000"/>
+              <a:buBlip>
+                <a:blip r:embed="rId3"/>
+              </a:buBlip>
+              <a:defRPr sz="1800">
+                <a:solidFill>
+                  <a:srgbClr val="000000"/>
+                </a:solidFill>
+                <a:uFillTx/>
+              </a:defRPr>
+            </a:pPr>
+            <a:r>
+              <a:rPr lang="en-US" sz="2600" dirty="0">
+                <a:solidFill>
+                  <a:schemeClr val="tx1"/>
+                </a:solidFill>
+                <a:latin typeface="Arial Unicode MS" panose="020B0604020202020204" pitchFamily="34" charset="-128"/>
+                <a:ea typeface="Arial Unicode MS" panose="020B0604020202020204" pitchFamily="34" charset="-128"/>
+                <a:cs typeface="Arial Unicode MS" panose="020B0604020202020204" pitchFamily="34" charset="-128"/>
+                <a:sym typeface="Iowan Old Style Roman"/>
+              </a:rPr>
+              <a:t>Minimum-zero, Maximum-one (0 ): </a:t>
+            </a:r>
+            <a:r>
+              <a:rPr lang="en-US" sz="2600" dirty="0" err="1">
+                <a:solidFill>
+                  <a:schemeClr val="tx1"/>
+                </a:solidFill>
+                <a:latin typeface="Arial Unicode MS" panose="020B0604020202020204" pitchFamily="34" charset="-128"/>
+                <a:ea typeface="Arial Unicode MS" panose="020B0604020202020204" pitchFamily="34" charset="-128"/>
+                <a:cs typeface="Arial Unicode MS" panose="020B0604020202020204" pitchFamily="34" charset="-128"/>
+                <a:sym typeface="Iowan Old Style Roman"/>
+              </a:rPr>
+              <a:t>eg</a:t>
+            </a:r>
+            <a:r>
+              <a:rPr lang="en-US" sz="2600" dirty="0">
+                <a:solidFill>
+                  <a:schemeClr val="tx1"/>
+                </a:solidFill>
+                <a:latin typeface="Arial Unicode MS" panose="020B0604020202020204" pitchFamily="34" charset="-128"/>
+                <a:ea typeface="Arial Unicode MS" panose="020B0604020202020204" pitchFamily="34" charset="-128"/>
+                <a:cs typeface="Arial Unicode MS" panose="020B0604020202020204" pitchFamily="34" charset="-128"/>
+                <a:sym typeface="Iowan Old Style Roman"/>
+              </a:rPr>
+              <a:t> a student may have 0 or 1 university email accounts</a:t>
+            </a:r>
+            <a:endParaRPr sz="2600" dirty="0">
+              <a:solidFill>
+                <a:schemeClr val="tx1"/>
+              </a:solidFill>
+              <a:uFill>
+                <a:solidFill/>
+              </a:uFill>
+              <a:latin typeface="Arial Unicode MS" panose="020B0604020202020204" pitchFamily="34" charset="-128"/>
+              <a:ea typeface="Arial Unicode MS" panose="020B0604020202020204" pitchFamily="34" charset="-128"/>
+              <a:cs typeface="Arial Unicode MS" panose="020B0604020202020204" pitchFamily="34" charset="-128"/>
+              <a:sym typeface="Iowan Old Style Roman"/>
+            </a:endParaRPr>
+          </a:p>
+        </p:txBody>
+      </p:sp>
+      <p:sp>
+        <p:nvSpPr>
+          <p:cNvPr id="427" name="Shape 427"/>
+          <p:cNvSpPr/>
+          <p:nvPr/>
+        </p:nvSpPr>
+        <p:spPr>
+          <a:xfrm>
+            <a:off x="5800776" y="4348075"/>
+            <a:ext cx="139344" cy="201586"/>
+          </a:xfrm>
+          <a:custGeom>
+            <a:avLst/>
+            <a:gdLst/>
+            <a:ahLst/>
+            <a:cxnLst>
+              <a:cxn ang="0">
+                <a:pos x="wd2" y="hd2"/>
+              </a:cxn>
+              <a:cxn ang="5400000">
+                <a:pos x="wd2" y="hd2"/>
+              </a:cxn>
+              <a:cxn ang="10800000">
+                <a:pos x="wd2" y="hd2"/>
+              </a:cxn>
+              <a:cxn ang="16200000">
+                <a:pos x="wd2" y="hd2"/>
+              </a:cxn>
+            </a:cxnLst>
+            <a:rect l="0" t="0" r="r" b="b"/>
+            <a:pathLst>
+              <a:path w="19679" h="19679" extrusionOk="0">
+                <a:moveTo>
+                  <a:pt x="16796" y="2882"/>
+                </a:moveTo>
+                <a:cubicBezTo>
+                  <a:pt x="20639" y="6724"/>
+                  <a:pt x="20639" y="12954"/>
+                  <a:pt x="16796" y="16796"/>
+                </a:cubicBezTo>
+                <a:cubicBezTo>
+                  <a:pt x="12954" y="20639"/>
+                  <a:pt x="6724" y="20639"/>
+                  <a:pt x="2882" y="16796"/>
+                </a:cubicBezTo>
+                <a:cubicBezTo>
+                  <a:pt x="-961" y="12954"/>
+                  <a:pt x="-961" y="6724"/>
+                  <a:pt x="2882" y="2882"/>
+                </a:cubicBezTo>
+                <a:cubicBezTo>
+                  <a:pt x="6724" y="-961"/>
+                  <a:pt x="12954" y="-961"/>
+                  <a:pt x="16796" y="2882"/>
+                </a:cubicBezTo>
+                <a:close/>
+              </a:path>
+            </a:pathLst>
+          </a:custGeom>
+          <a:ln w="25400">
+            <a:solidFill>
+              <a:srgbClr val="011993"/>
+            </a:solidFill>
+            <a:round/>
+          </a:ln>
+        </p:spPr>
+        <p:txBody>
+          <a:bodyPr lIns="0" tIns="0" rIns="0" bIns="0"/>
+          <a:lstStyle/>
+          <a:p>
+            <a:pPr lvl="0">
+              <a:defRPr sz="1800">
+                <a:solidFill>
+                  <a:srgbClr val="011993"/>
+                </a:solidFill>
+                <a:latin typeface="+mn-lt"/>
+                <a:ea typeface="+mn-ea"/>
+                <a:cs typeface="+mn-cs"/>
+                <a:sym typeface="Arial"/>
+              </a:defRPr>
+            </a:pPr>
+            <a:endParaRPr dirty="0">
+              <a:solidFill>
+                <a:schemeClr val="tx1"/>
+              </a:solidFill>
+              <a:latin typeface="Arial Unicode MS" panose="020B0604020202020204" pitchFamily="34" charset="-128"/>
+              <a:ea typeface="Arial Unicode MS" panose="020B0604020202020204" pitchFamily="34" charset="-128"/>
+              <a:cs typeface="Arial Unicode MS" panose="020B0604020202020204" pitchFamily="34" charset="-128"/>
+            </a:endParaRPr>
+          </a:p>
+        </p:txBody>
+      </p:sp>
+      <p:sp>
+        <p:nvSpPr>
+          <p:cNvPr id="428" name="Shape 428"/>
+          <p:cNvSpPr/>
+          <p:nvPr/>
+        </p:nvSpPr>
+        <p:spPr>
+          <a:xfrm>
+            <a:off x="5968259" y="4442183"/>
+            <a:ext cx="164744" cy="1"/>
+          </a:xfrm>
+          <a:prstGeom prst="line">
+            <a:avLst/>
+          </a:prstGeom>
+          <a:ln w="25400">
+            <a:solidFill>
+              <a:srgbClr val="011993"/>
+            </a:solidFill>
+            <a:round/>
+          </a:ln>
+          <a:effectLst>
+            <a:outerShdw blurRad="38100" dist="20000" dir="5400000" rotWithShape="0">
+              <a:srgbClr val="000000">
+                <a:alpha val="38000"/>
+              </a:srgbClr>
+            </a:outerShdw>
+          </a:effectLst>
+        </p:spPr>
+        <p:txBody>
+          <a:bodyPr lIns="0" tIns="0" rIns="0" bIns="0"/>
+          <a:lstStyle/>
+          <a:p>
+            <a:pPr lvl="0" defTabSz="457200">
+              <a:defRPr sz="1200">
+                <a:solidFill>
+                  <a:srgbClr val="000000"/>
+                </a:solidFill>
+                <a:uFillTx/>
+                <a:latin typeface="+mj-lt"/>
+                <a:ea typeface="+mj-ea"/>
+                <a:cs typeface="+mj-cs"/>
+                <a:sym typeface="Helvetica"/>
+              </a:defRPr>
+            </a:pPr>
+            <a:endParaRPr dirty="0">
+              <a:solidFill>
+                <a:schemeClr val="tx1"/>
+              </a:solidFill>
+              <a:latin typeface="Arial Unicode MS" panose="020B0604020202020204" pitchFamily="34" charset="-128"/>
+              <a:ea typeface="Arial Unicode MS" panose="020B0604020202020204" pitchFamily="34" charset="-128"/>
+              <a:cs typeface="Arial Unicode MS" panose="020B0604020202020204" pitchFamily="34" charset="-128"/>
+            </a:endParaRPr>
+          </a:p>
+        </p:txBody>
+      </p:sp>
+      <p:sp>
+        <p:nvSpPr>
+          <p:cNvPr id="429" name="Shape 429"/>
+          <p:cNvSpPr/>
+          <p:nvPr/>
+        </p:nvSpPr>
+        <p:spPr>
+          <a:xfrm flipV="1">
+            <a:off x="5965530" y="4270961"/>
+            <a:ext cx="170201" cy="170200"/>
+          </a:xfrm>
+          <a:prstGeom prst="line">
+            <a:avLst/>
+          </a:prstGeom>
+          <a:ln w="25400">
+            <a:solidFill>
+              <a:srgbClr val="011993"/>
+            </a:solidFill>
+            <a:round/>
+          </a:ln>
+          <a:effectLst>
+            <a:outerShdw blurRad="38100" dist="20000" dir="5400000" rotWithShape="0">
+              <a:srgbClr val="000000">
+                <a:alpha val="38000"/>
+              </a:srgbClr>
+            </a:outerShdw>
+          </a:effectLst>
+        </p:spPr>
+        <p:txBody>
+          <a:bodyPr lIns="0" tIns="0" rIns="0" bIns="0"/>
+          <a:lstStyle/>
+          <a:p>
+            <a:pPr lvl="0" defTabSz="457200">
+              <a:defRPr sz="1200">
+                <a:solidFill>
+                  <a:srgbClr val="000000"/>
+                </a:solidFill>
+                <a:uFillTx/>
+                <a:latin typeface="+mj-lt"/>
+                <a:ea typeface="+mj-ea"/>
+                <a:cs typeface="+mj-cs"/>
+                <a:sym typeface="Helvetica"/>
+              </a:defRPr>
+            </a:pPr>
+            <a:endParaRPr dirty="0">
+              <a:solidFill>
+                <a:schemeClr val="tx1"/>
+              </a:solidFill>
+              <a:latin typeface="Arial Unicode MS" panose="020B0604020202020204" pitchFamily="34" charset="-128"/>
+              <a:ea typeface="Arial Unicode MS" panose="020B0604020202020204" pitchFamily="34" charset="-128"/>
+              <a:cs typeface="Arial Unicode MS" panose="020B0604020202020204" pitchFamily="34" charset="-128"/>
+            </a:endParaRPr>
+          </a:p>
+        </p:txBody>
+      </p:sp>
+      <p:sp>
+        <p:nvSpPr>
+          <p:cNvPr id="430" name="Shape 430"/>
+          <p:cNvSpPr/>
+          <p:nvPr/>
+        </p:nvSpPr>
+        <p:spPr>
+          <a:xfrm flipH="1" flipV="1">
+            <a:off x="5961958" y="4436730"/>
+            <a:ext cx="177346" cy="177346"/>
+          </a:xfrm>
+          <a:prstGeom prst="line">
+            <a:avLst/>
+          </a:prstGeom>
+          <a:ln w="25400">
+            <a:solidFill>
+              <a:srgbClr val="011993"/>
+            </a:solidFill>
+            <a:round/>
+          </a:ln>
+          <a:effectLst>
+            <a:outerShdw blurRad="38100" dist="20000" dir="5400000" rotWithShape="0">
+              <a:srgbClr val="000000">
+                <a:alpha val="38000"/>
+              </a:srgbClr>
+            </a:outerShdw>
+          </a:effectLst>
+        </p:spPr>
+        <p:txBody>
+          <a:bodyPr lIns="0" tIns="0" rIns="0" bIns="0"/>
+          <a:lstStyle/>
+          <a:p>
+            <a:pPr lvl="0" defTabSz="457200">
+              <a:defRPr sz="1200">
+                <a:solidFill>
+                  <a:srgbClr val="000000"/>
+                </a:solidFill>
+                <a:uFillTx/>
+                <a:latin typeface="+mj-lt"/>
+                <a:ea typeface="+mj-ea"/>
+                <a:cs typeface="+mj-cs"/>
+                <a:sym typeface="Helvetica"/>
+              </a:defRPr>
+            </a:pPr>
+            <a:endParaRPr dirty="0">
+              <a:solidFill>
+                <a:schemeClr val="tx1"/>
+              </a:solidFill>
+              <a:latin typeface="Arial Unicode MS" panose="020B0604020202020204" pitchFamily="34" charset="-128"/>
+              <a:ea typeface="Arial Unicode MS" panose="020B0604020202020204" pitchFamily="34" charset="-128"/>
+              <a:cs typeface="Arial Unicode MS" panose="020B0604020202020204" pitchFamily="34" charset="-128"/>
+            </a:endParaRPr>
+          </a:p>
+        </p:txBody>
+      </p:sp>
+      <p:sp>
+        <p:nvSpPr>
+          <p:cNvPr id="431" name="Shape 431"/>
+          <p:cNvSpPr/>
+          <p:nvPr/>
+        </p:nvSpPr>
+        <p:spPr>
+          <a:xfrm>
+            <a:off x="5791807" y="2740484"/>
+            <a:ext cx="164744" cy="1"/>
+          </a:xfrm>
+          <a:prstGeom prst="line">
+            <a:avLst/>
+          </a:prstGeom>
+          <a:ln w="25400">
+            <a:solidFill>
+              <a:srgbClr val="011993"/>
+            </a:solidFill>
+            <a:round/>
+          </a:ln>
+          <a:effectLst>
+            <a:outerShdw blurRad="38100" dist="20000" dir="5400000" rotWithShape="0">
+              <a:srgbClr val="000000">
+                <a:alpha val="38000"/>
+              </a:srgbClr>
+            </a:outerShdw>
+          </a:effectLst>
+        </p:spPr>
+        <p:txBody>
+          <a:bodyPr lIns="0" tIns="0" rIns="0" bIns="0"/>
+          <a:lstStyle/>
+          <a:p>
+            <a:pPr lvl="0" defTabSz="457200">
+              <a:defRPr sz="1200">
+                <a:solidFill>
+                  <a:srgbClr val="000000"/>
+                </a:solidFill>
+                <a:uFillTx/>
+                <a:latin typeface="+mj-lt"/>
+                <a:ea typeface="+mj-ea"/>
+                <a:cs typeface="+mj-cs"/>
+                <a:sym typeface="Helvetica"/>
+              </a:defRPr>
+            </a:pPr>
+            <a:endParaRPr dirty="0">
+              <a:solidFill>
+                <a:schemeClr val="tx1"/>
+              </a:solidFill>
+              <a:latin typeface="Arial Unicode MS" panose="020B0604020202020204" pitchFamily="34" charset="-128"/>
+              <a:ea typeface="Arial Unicode MS" panose="020B0604020202020204" pitchFamily="34" charset="-128"/>
+              <a:cs typeface="Arial Unicode MS" panose="020B0604020202020204" pitchFamily="34" charset="-128"/>
+            </a:endParaRPr>
+          </a:p>
+        </p:txBody>
+      </p:sp>
+      <p:sp>
+        <p:nvSpPr>
+          <p:cNvPr id="432" name="Shape 432"/>
+          <p:cNvSpPr/>
+          <p:nvPr/>
+        </p:nvSpPr>
+        <p:spPr>
+          <a:xfrm flipV="1">
+            <a:off x="5780197" y="2569262"/>
+            <a:ext cx="170201" cy="170200"/>
+          </a:xfrm>
+          <a:prstGeom prst="line">
+            <a:avLst/>
+          </a:prstGeom>
+          <a:ln w="25400">
+            <a:solidFill>
+              <a:srgbClr val="011993"/>
+            </a:solidFill>
+            <a:round/>
+          </a:ln>
+          <a:effectLst>
+            <a:outerShdw blurRad="38100" dist="20000" dir="5400000" rotWithShape="0">
+              <a:srgbClr val="000000">
+                <a:alpha val="38000"/>
+              </a:srgbClr>
+            </a:outerShdw>
+          </a:effectLst>
+        </p:spPr>
+        <p:txBody>
+          <a:bodyPr lIns="0" tIns="0" rIns="0" bIns="0"/>
+          <a:lstStyle/>
+          <a:p>
+            <a:pPr lvl="0" defTabSz="457200">
+              <a:defRPr sz="1200">
+                <a:solidFill>
+                  <a:srgbClr val="000000"/>
+                </a:solidFill>
+                <a:uFillTx/>
+                <a:latin typeface="+mj-lt"/>
+                <a:ea typeface="+mj-ea"/>
+                <a:cs typeface="+mj-cs"/>
+                <a:sym typeface="Helvetica"/>
+              </a:defRPr>
+            </a:pPr>
+            <a:endParaRPr dirty="0">
+              <a:solidFill>
+                <a:schemeClr val="tx1"/>
+              </a:solidFill>
+              <a:latin typeface="Arial Unicode MS" panose="020B0604020202020204" pitchFamily="34" charset="-128"/>
+              <a:ea typeface="Arial Unicode MS" panose="020B0604020202020204" pitchFamily="34" charset="-128"/>
+              <a:cs typeface="Arial Unicode MS" panose="020B0604020202020204" pitchFamily="34" charset="-128"/>
+            </a:endParaRPr>
+          </a:p>
+        </p:txBody>
+      </p:sp>
+      <p:sp>
+        <p:nvSpPr>
+          <p:cNvPr id="433" name="Shape 433"/>
+          <p:cNvSpPr/>
+          <p:nvPr/>
+        </p:nvSpPr>
+        <p:spPr>
+          <a:xfrm flipH="1" flipV="1">
+            <a:off x="5785497" y="2735031"/>
+            <a:ext cx="177346" cy="177346"/>
+          </a:xfrm>
+          <a:prstGeom prst="line">
+            <a:avLst/>
+          </a:prstGeom>
+          <a:ln w="25400">
+            <a:solidFill>
+              <a:srgbClr val="011993"/>
+            </a:solidFill>
+            <a:round/>
+          </a:ln>
+          <a:effectLst>
+            <a:outerShdw blurRad="38100" dist="20000" dir="5400000" rotWithShape="0">
+              <a:srgbClr val="000000">
+                <a:alpha val="38000"/>
+              </a:srgbClr>
+            </a:outerShdw>
+          </a:effectLst>
+        </p:spPr>
+        <p:txBody>
+          <a:bodyPr lIns="0" tIns="0" rIns="0" bIns="0"/>
+          <a:lstStyle/>
+          <a:p>
+            <a:pPr lvl="0" defTabSz="457200">
+              <a:defRPr sz="1200">
+                <a:solidFill>
+                  <a:srgbClr val="000000"/>
+                </a:solidFill>
+                <a:uFillTx/>
+                <a:latin typeface="+mj-lt"/>
+                <a:ea typeface="+mj-ea"/>
+                <a:cs typeface="+mj-cs"/>
+                <a:sym typeface="Helvetica"/>
+              </a:defRPr>
+            </a:pPr>
+            <a:endParaRPr dirty="0">
+              <a:solidFill>
+                <a:schemeClr val="tx1"/>
+              </a:solidFill>
+              <a:latin typeface="Arial Unicode MS" panose="020B0604020202020204" pitchFamily="34" charset="-128"/>
+              <a:ea typeface="Arial Unicode MS" panose="020B0604020202020204" pitchFamily="34" charset="-128"/>
+              <a:cs typeface="Arial Unicode MS" panose="020B0604020202020204" pitchFamily="34" charset="-128"/>
+            </a:endParaRPr>
+          </a:p>
+        </p:txBody>
+      </p:sp>
+      <p:sp>
+        <p:nvSpPr>
+          <p:cNvPr id="12" name="Shape 428"/>
+          <p:cNvSpPr/>
+          <p:nvPr/>
+        </p:nvSpPr>
+        <p:spPr>
+          <a:xfrm>
+            <a:off x="5650149" y="6059402"/>
+            <a:ext cx="155851" cy="0"/>
+          </a:xfrm>
+          <a:prstGeom prst="line">
+            <a:avLst/>
+          </a:prstGeom>
+          <a:ln w="25400">
+            <a:solidFill>
+              <a:srgbClr val="011993"/>
+            </a:solidFill>
+            <a:round/>
+          </a:ln>
+          <a:effectLst>
+            <a:outerShdw blurRad="38100" dist="20000" dir="5400000" rotWithShape="0">
+              <a:srgbClr val="000000">
+                <a:alpha val="38000"/>
+              </a:srgbClr>
+            </a:outerShdw>
+          </a:effectLst>
+        </p:spPr>
+        <p:txBody>
+          <a:bodyPr lIns="0" tIns="0" rIns="0" bIns="0"/>
+          <a:lstStyle/>
+          <a:p>
+            <a:pPr lvl="0" defTabSz="457200">
+              <a:defRPr sz="1200">
+                <a:solidFill>
+                  <a:srgbClr val="000000"/>
+                </a:solidFill>
+                <a:uFillTx/>
+                <a:latin typeface="+mj-lt"/>
+                <a:ea typeface="+mj-ea"/>
+                <a:cs typeface="+mj-cs"/>
+                <a:sym typeface="Helvetica"/>
+              </a:defRPr>
+            </a:pPr>
+            <a:endParaRPr dirty="0">
+              <a:solidFill>
+                <a:schemeClr val="tx1"/>
+              </a:solidFill>
+              <a:latin typeface="Arial Unicode MS" panose="020B0604020202020204" pitchFamily="34" charset="-128"/>
+              <a:ea typeface="Arial Unicode MS" panose="020B0604020202020204" pitchFamily="34" charset="-128"/>
+              <a:cs typeface="Arial Unicode MS" panose="020B0604020202020204" pitchFamily="34" charset="-128"/>
+            </a:endParaRPr>
+          </a:p>
+        </p:txBody>
+      </p:sp>
+      <p:sp>
+        <p:nvSpPr>
+          <p:cNvPr id="13" name="Shape 430"/>
+          <p:cNvSpPr/>
+          <p:nvPr/>
+        </p:nvSpPr>
+        <p:spPr>
+          <a:xfrm flipV="1">
+            <a:off x="5727054" y="5940968"/>
+            <a:ext cx="2" cy="260545"/>
+          </a:xfrm>
+          <a:prstGeom prst="line">
+            <a:avLst/>
+          </a:prstGeom>
+          <a:ln w="25400">
+            <a:solidFill>
+              <a:srgbClr val="011993"/>
+            </a:solidFill>
+            <a:round/>
+          </a:ln>
+          <a:effectLst>
+            <a:outerShdw blurRad="38100" dist="20000" dir="5400000" rotWithShape="0">
+              <a:srgbClr val="000000">
+                <a:alpha val="38000"/>
+              </a:srgbClr>
+            </a:outerShdw>
+          </a:effectLst>
+        </p:spPr>
+        <p:txBody>
+          <a:bodyPr lIns="0" tIns="0" rIns="0" bIns="0"/>
+          <a:lstStyle/>
+          <a:p>
+            <a:pPr lvl="0" defTabSz="457200">
+              <a:defRPr sz="1200">
+                <a:solidFill>
+                  <a:srgbClr val="000000"/>
+                </a:solidFill>
+                <a:uFillTx/>
+                <a:latin typeface="+mj-lt"/>
+                <a:ea typeface="+mj-ea"/>
+                <a:cs typeface="+mj-cs"/>
+                <a:sym typeface="Helvetica"/>
+              </a:defRPr>
+            </a:pPr>
+            <a:endParaRPr dirty="0">
+              <a:solidFill>
+                <a:schemeClr val="tx1"/>
+              </a:solidFill>
+              <a:latin typeface="Arial Unicode MS" panose="020B0604020202020204" pitchFamily="34" charset="-128"/>
+              <a:ea typeface="Arial Unicode MS" panose="020B0604020202020204" pitchFamily="34" charset="-128"/>
+              <a:cs typeface="Arial Unicode MS" panose="020B0604020202020204" pitchFamily="34" charset="-128"/>
+            </a:endParaRPr>
+          </a:p>
+        </p:txBody>
+      </p:sp>
+    </p:spTree>
+  </p:cSld>
+  <p:clrMapOvr>
+    <a:masterClrMapping/>
+  </p:clrMapOvr>
+  <p:transition spd="med"/>
+</p:sld>
+</file>
+
+<file path=ppt/slides/slide19.xml><?xml version="1.0" encoding="utf-8"?>
+<p:sld xmlns:a="http://schemas.openxmlformats.org/drawingml/2006/main" xmlns:r="http://schemas.openxmlformats.org/officeDocument/2006/relationships" xmlns:p="http://schemas.openxmlformats.org/presentationml/2006/main">
+  <p:cSld>
+    <p:spTree>
+      <p:nvGrpSpPr>
+        <p:cNvPr id="1" name=""/>
+        <p:cNvGrpSpPr/>
+        <p:nvPr/>
+      </p:nvGrpSpPr>
+      <p:grpSpPr>
+        <a:xfrm>
+          <a:off x="0" y="0"/>
+          <a:ext cx="0" cy="0"/>
+          <a:chOff x="0" y="0"/>
+          <a:chExt cx="0" cy="0"/>
+        </a:xfrm>
+      </p:grpSpPr>
+      <p:sp>
+        <p:nvSpPr>
+          <p:cNvPr id="436" name="Shape 436"/>
+          <p:cNvSpPr/>
+          <p:nvPr/>
+        </p:nvSpPr>
+        <p:spPr>
+          <a:xfrm>
+            <a:off x="386308" y="147496"/>
+            <a:ext cx="7757379" cy="461665"/>
+          </a:xfrm>
+          <a:prstGeom prst="rect">
+            <a:avLst/>
+          </a:prstGeom>
+          <a:ln w="12700">
+            <a:miter lim="400000"/>
+          </a:ln>
+          <a:extLst>
+            <a:ext uri="{C572A759-6A51-4108-AA02-DFA0A04FC94B}">
+              <ma14:wrappingTextBoxFlag xmlns="" xmlns:ma14="http://schemas.microsoft.com/office/mac/drawingml/2011/main" val="1"/>
+            </a:ext>
+          </a:extLst>
+        </p:spPr>
+        <p:txBody>
+          <a:bodyPr lIns="0" tIns="0" rIns="0" bIns="0">
+            <a:spAutoFit/>
+          </a:bodyPr>
+          <a:lstStyle>
+            <a:lvl1pPr>
+              <a:defRPr sz="3000" b="1">
+                <a:uFill>
+                  <a:solidFill>
+                    <a:srgbClr val="FFFFFF"/>
+                  </a:solidFill>
+                </a:uFill>
+              </a:defRPr>
+            </a:lvl1pPr>
+          </a:lstStyle>
+          <a:p>
+            <a:pPr lvl="0">
+              <a:defRPr sz="1800" b="0">
+                <a:solidFill>
+                  <a:srgbClr val="000000"/>
+                </a:solidFill>
+                <a:uFillTx/>
+              </a:defRPr>
+            </a:pPr>
+            <a:r>
+              <a:rPr sz="3000" b="0" dirty="0">
+                <a:solidFill>
+                  <a:srgbClr val="57068C"/>
                 </a:solidFill>
                 <a:uFill>
                   <a:solidFill>
@@ -16079,7 +16200,11 @@
               <a:defRPr/>
             </a:pPr>
             <a:r>
-              <a:rPr lang="en-US"/>
+              <a:rPr lang="en-US" dirty="0">
+                <a:solidFill>
+                  <a:srgbClr val="57068C"/>
+                </a:solidFill>
+              </a:rPr>
               <a:t>Why do we need databases?</a:t>
             </a:r>
           </a:p>
@@ -16195,9 +16320,9 @@
               </a:defRPr>
             </a:pPr>
             <a:r>
-              <a:rPr sz="3000" b="1" dirty="0">
-                <a:solidFill>
-                  <a:schemeClr val="tx1"/>
+              <a:rPr sz="3000" b="0" dirty="0">
+                <a:solidFill>
+                  <a:srgbClr val="57068C"/>
                 </a:solidFill>
                 <a:uFill>
                   <a:solidFill>
@@ -17728,9 +17853,9 @@
               </a:defRPr>
             </a:pPr>
             <a:r>
-              <a:rPr sz="3000" b="1" dirty="0">
-                <a:solidFill>
-                  <a:schemeClr val="tx1"/>
+              <a:rPr sz="3000" b="0" dirty="0">
+                <a:solidFill>
+                  <a:srgbClr val="57068C"/>
                 </a:solidFill>
                 <a:uFill>
                   <a:solidFill>
@@ -19048,9 +19173,9 @@
               </a:defRPr>
             </a:pPr>
             <a:r>
-              <a:rPr sz="3000" b="1" dirty="0">
-                <a:solidFill>
-                  <a:schemeClr val="tx1"/>
+              <a:rPr sz="3000" b="0" dirty="0">
+                <a:solidFill>
+                  <a:srgbClr val="57068C"/>
                 </a:solidFill>
                 <a:uFill>
                   <a:solidFill>
@@ -21876,9 +22001,9 @@
               </a:defRPr>
             </a:pPr>
             <a:r>
-              <a:rPr sz="3000" b="1" dirty="0">
-                <a:solidFill>
-                  <a:schemeClr val="tx1"/>
+              <a:rPr sz="3000" b="0" dirty="0">
+                <a:solidFill>
+                  <a:srgbClr val="57068C"/>
                 </a:solidFill>
                 <a:uFill>
                   <a:solidFill>
@@ -22563,9 +22688,9 @@
               </a:defRPr>
             </a:pPr>
             <a:r>
-              <a:rPr lang="en-US" sz="3000" b="1" dirty="0">
-                <a:solidFill>
-                  <a:schemeClr val="tx1"/>
+              <a:rPr lang="en-US" sz="3000" b="0" dirty="0">
+                <a:solidFill>
+                  <a:srgbClr val="57068C"/>
                 </a:solidFill>
                 <a:uFill>
                   <a:solidFill>
@@ -22579,9 +22704,9 @@
               <a:t>In-class (simple) example: </a:t>
             </a:r>
             <a:br>
-              <a:rPr lang="en-US" sz="3000" b="1" dirty="0">
-                <a:solidFill>
-                  <a:schemeClr val="tx1"/>
+              <a:rPr lang="en-US" sz="3000" b="0" dirty="0">
+                <a:solidFill>
+                  <a:srgbClr val="57068C"/>
                 </a:solidFill>
                 <a:uFill>
                   <a:solidFill>
@@ -22594,9 +22719,9 @@
               </a:rPr>
             </a:br>
             <a:r>
-              <a:rPr sz="3000" b="1" dirty="0">
-                <a:solidFill>
-                  <a:schemeClr val="tx1"/>
+              <a:rPr sz="3000" b="0" dirty="0">
+                <a:solidFill>
+                  <a:srgbClr val="57068C"/>
                 </a:solidFill>
                 <a:uFill>
                   <a:solidFill>
@@ -22610,9 +22735,9 @@
               <a:t>Create the following ERD</a:t>
             </a:r>
             <a:r>
-              <a:rPr lang="en-US" sz="3000" b="1" dirty="0">
-                <a:solidFill>
-                  <a:schemeClr val="tx1"/>
+              <a:rPr lang="en-US" sz="3000" b="0" dirty="0">
+                <a:solidFill>
+                  <a:srgbClr val="57068C"/>
                 </a:solidFill>
                 <a:uFill>
                   <a:solidFill>
@@ -22625,9 +22750,9 @@
               </a:rPr>
               <a:t>s</a:t>
             </a:r>
-            <a:endParaRPr sz="3000" b="1" dirty="0">
+            <a:endParaRPr sz="3000" b="0" dirty="0">
               <a:solidFill>
-                <a:schemeClr val="tx1"/>
+                <a:srgbClr val="57068C"/>
               </a:solidFill>
               <a:uFill>
                 <a:solidFill>
@@ -22831,7 +22956,11 @@
               <a:defRPr/>
             </a:pPr>
             <a:r>
-              <a:rPr lang="en-US"/>
+              <a:rPr lang="en-US" dirty="0">
+                <a:solidFill>
+                  <a:srgbClr val="57068C"/>
+                </a:solidFill>
+              </a:rPr>
               <a:t>Databases vs. Spreadsheets</a:t>
             </a:r>
           </a:p>
@@ -23198,7 +23327,11 @@
               <a:defRPr/>
             </a:pPr>
             <a:r>
-              <a:rPr lang="en-US" dirty="0"/>
+              <a:rPr lang="en-US" dirty="0">
+                <a:solidFill>
+                  <a:srgbClr val="57068C"/>
+                </a:solidFill>
+              </a:rPr>
               <a:t>Anomalies in un-normalized data</a:t>
             </a:r>
           </a:p>
@@ -23594,7 +23727,11 @@
               <a:defRPr/>
             </a:pPr>
             <a:r>
-              <a:rPr lang="en-US" dirty="0"/>
+              <a:rPr lang="en-US" dirty="0">
+                <a:solidFill>
+                  <a:srgbClr val="57068C"/>
+                </a:solidFill>
+              </a:rPr>
               <a:t>Anomalies in un-normalized data</a:t>
             </a:r>
           </a:p>
@@ -24058,7 +24195,11 @@
               <a:defRPr/>
             </a:pPr>
             <a:r>
-              <a:rPr lang="en-US" dirty="0"/>
+              <a:rPr lang="en-US" dirty="0">
+                <a:solidFill>
+                  <a:srgbClr val="57068C"/>
+                </a:solidFill>
+              </a:rPr>
               <a:t>Anomalies in un-normalized data</a:t>
             </a:r>
           </a:p>
@@ -24356,9 +24497,9 @@
               </a:defRPr>
             </a:pPr>
             <a:r>
-              <a:rPr sz="3600" dirty="0">
-                <a:solidFill>
-                  <a:schemeClr val="tx1"/>
+              <a:rPr sz="3600" b="1" dirty="0">
+                <a:solidFill>
+                  <a:srgbClr val="57068C"/>
                 </a:solidFill>
                 <a:uFill>
                   <a:solidFill/>
@@ -24370,9 +24511,9 @@
               <a:t>Entity Relationship Diagram</a:t>
             </a:r>
             <a:r>
-              <a:rPr lang="en-US" sz="3600" dirty="0">
-                <a:solidFill>
-                  <a:schemeClr val="tx1"/>
+              <a:rPr lang="en-US" sz="3600" b="1" dirty="0">
+                <a:solidFill>
+                  <a:srgbClr val="57068C"/>
                 </a:solidFill>
                 <a:uFill>
                   <a:solidFill/>
@@ -24384,9 +24525,9 @@
               <a:t>s</a:t>
             </a:r>
             <a:r>
-              <a:rPr sz="3600" dirty="0">
-                <a:solidFill>
-                  <a:schemeClr val="tx1"/>
+              <a:rPr sz="3600" b="1" dirty="0">
+                <a:solidFill>
+                  <a:srgbClr val="57068C"/>
                 </a:solidFill>
                 <a:uFill>
                   <a:solidFill/>
@@ -24442,7 +24583,11 @@
           <a:lstStyle/>
           <a:p>
             <a:r>
-              <a:rPr lang="en-US" dirty="0"/>
+              <a:rPr lang="en-US" dirty="0">
+                <a:solidFill>
+                  <a:srgbClr val="57068C"/>
+                </a:solidFill>
+              </a:rPr>
               <a:t>Basic Concepts</a:t>
             </a:r>
           </a:p>
@@ -24561,7 +24706,11 @@
               <a:defRPr/>
             </a:pPr>
             <a:r>
-              <a:rPr lang="en-US" dirty="0"/>
+              <a:rPr lang="en-US" dirty="0">
+                <a:solidFill>
+                  <a:srgbClr val="57068C"/>
+                </a:solidFill>
+              </a:rPr>
               <a:t>A “normalized” version of the spreadsheet</a:t>
             </a:r>
           </a:p>

</xml_diff>